<commit_message>
add description of oauth extension points. #2820
</commit_message>
<xml_diff>
--- a/source/Security/images_OAuth/materialOAuth.pptx
+++ b/source/Security/images_OAuth/materialOAuth.pptx
@@ -5,7 +5,7 @@
     <p:sldMasterId id="2147483648" r:id="rId1"/>
   </p:sldMasterIdLst>
   <p:notesMasterIdLst>
-    <p:notesMasterId r:id="rId23"/>
+    <p:notesMasterId r:id="rId25"/>
   </p:notesMasterIdLst>
   <p:sldIdLst>
     <p:sldId id="272" r:id="rId2"/>
@@ -29,6 +29,8 @@
     <p:sldId id="257" r:id="rId20"/>
     <p:sldId id="270" r:id="rId21"/>
     <p:sldId id="271" r:id="rId22"/>
+    <p:sldId id="296" r:id="rId23"/>
+    <p:sldId id="298" r:id="rId24"/>
   </p:sldIdLst>
   <p:sldSz cx="12192000" cy="6858000"/>
   <p:notesSz cx="6858000" cy="9144000"/>
@@ -163,6 +165,12 @@
             <p14:sldId id="271"/>
           </p14:sldIdLst>
         </p14:section>
+        <p14:section name="Appendix" id="{082A9C9C-DA9A-4752-A7DE-699D2A27A3BD}">
+          <p14:sldIdLst>
+            <p14:sldId id="296"/>
+            <p14:sldId id="298"/>
+          </p14:sldIdLst>
+        </p14:section>
       </p14:sectionLst>
     </p:ext>
     <p:ext uri="{EFAFB233-063F-42B5-8137-9DF3F51BA10A}">
@@ -254,7 +262,7 @@
           <a:p>
             <a:fld id="{E364C4AB-FECB-4A61-B71C-A45CCAC46987}" type="datetimeFigureOut">
               <a:rPr kumimoji="1" lang="ja-JP" altLang="en-US" smtClean="0"/>
-              <a:t>2017/8/28</a:t>
+              <a:t>2017/8/31</a:t>
             </a:fld>
             <a:endParaRPr kumimoji="1" lang="ja-JP" altLang="en-US"/>
           </a:p>
@@ -638,6 +646,174 @@
 </p:notes>
 </file>
 
+<file path=ppt/notesSlides/notesSlide10.xml><?xml version="1.0" encoding="utf-8"?>
+<p:notes xmlns:a="http://schemas.openxmlformats.org/drawingml/2006/main" xmlns:r="http://schemas.openxmlformats.org/officeDocument/2006/relationships" xmlns:p="http://schemas.openxmlformats.org/presentationml/2006/main">
+  <p:cSld>
+    <p:spTree>
+      <p:nvGrpSpPr>
+        <p:cNvPr id="1" name=""/>
+        <p:cNvGrpSpPr/>
+        <p:nvPr/>
+      </p:nvGrpSpPr>
+      <p:grpSpPr>
+        <a:xfrm>
+          <a:off x="0" y="0"/>
+          <a:ext cx="0" cy="0"/>
+          <a:chOff x="0" y="0"/>
+          <a:chExt cx="0" cy="0"/>
+        </a:xfrm>
+      </p:grpSpPr>
+      <p:sp>
+        <p:nvSpPr>
+          <p:cNvPr id="2" name="スライド イメージ プレースホルダー 1"/>
+          <p:cNvSpPr>
+            <a:spLocks noGrp="1" noRot="1" noChangeAspect="1"/>
+          </p:cNvSpPr>
+          <p:nvPr>
+            <p:ph type="sldImg"/>
+          </p:nvPr>
+        </p:nvSpPr>
+        <p:spPr/>
+      </p:sp>
+      <p:sp>
+        <p:nvSpPr>
+          <p:cNvPr id="3" name="ノート プレースホルダー 2"/>
+          <p:cNvSpPr>
+            <a:spLocks noGrp="1"/>
+          </p:cNvSpPr>
+          <p:nvPr>
+            <p:ph type="body" idx="1"/>
+          </p:nvPr>
+        </p:nvSpPr>
+        <p:spPr/>
+        <p:txBody>
+          <a:bodyPr/>
+          <a:lstStyle/>
+          <a:p>
+            <a:endParaRPr kumimoji="1" lang="ja-JP" altLang="en-US" dirty="0"/>
+          </a:p>
+        </p:txBody>
+      </p:sp>
+      <p:sp>
+        <p:nvSpPr>
+          <p:cNvPr id="4" name="スライド番号プレースホルダー 3"/>
+          <p:cNvSpPr>
+            <a:spLocks noGrp="1"/>
+          </p:cNvSpPr>
+          <p:nvPr>
+            <p:ph type="sldNum" sz="quarter" idx="10"/>
+          </p:nvPr>
+        </p:nvSpPr>
+        <p:spPr/>
+        <p:txBody>
+          <a:bodyPr/>
+          <a:lstStyle/>
+          <a:p>
+            <a:fld id="{9F1B7F1F-FDAA-480C-AB59-C4CE09E787E7}" type="slidenum">
+              <a:rPr kumimoji="1" lang="ja-JP" altLang="en-US" smtClean="0"/>
+              <a:t>22</a:t>
+            </a:fld>
+            <a:endParaRPr kumimoji="1" lang="ja-JP" altLang="en-US"/>
+          </a:p>
+        </p:txBody>
+      </p:sp>
+    </p:spTree>
+    <p:extLst>
+      <p:ext uri="{BB962C8B-B14F-4D97-AF65-F5344CB8AC3E}">
+        <p14:creationId xmlns:p14="http://schemas.microsoft.com/office/powerpoint/2010/main" val="1589784847"/>
+      </p:ext>
+    </p:extLst>
+  </p:cSld>
+  <p:clrMapOvr>
+    <a:masterClrMapping/>
+  </p:clrMapOvr>
+</p:notes>
+</file>
+
+<file path=ppt/notesSlides/notesSlide11.xml><?xml version="1.0" encoding="utf-8"?>
+<p:notes xmlns:a="http://schemas.openxmlformats.org/drawingml/2006/main" xmlns:r="http://schemas.openxmlformats.org/officeDocument/2006/relationships" xmlns:p="http://schemas.openxmlformats.org/presentationml/2006/main">
+  <p:cSld>
+    <p:spTree>
+      <p:nvGrpSpPr>
+        <p:cNvPr id="1" name=""/>
+        <p:cNvGrpSpPr/>
+        <p:nvPr/>
+      </p:nvGrpSpPr>
+      <p:grpSpPr>
+        <a:xfrm>
+          <a:off x="0" y="0"/>
+          <a:ext cx="0" cy="0"/>
+          <a:chOff x="0" y="0"/>
+          <a:chExt cx="0" cy="0"/>
+        </a:xfrm>
+      </p:grpSpPr>
+      <p:sp>
+        <p:nvSpPr>
+          <p:cNvPr id="2" name="スライド イメージ プレースホルダー 1"/>
+          <p:cNvSpPr>
+            <a:spLocks noGrp="1" noRot="1" noChangeAspect="1"/>
+          </p:cNvSpPr>
+          <p:nvPr>
+            <p:ph type="sldImg"/>
+          </p:nvPr>
+        </p:nvSpPr>
+        <p:spPr/>
+      </p:sp>
+      <p:sp>
+        <p:nvSpPr>
+          <p:cNvPr id="3" name="ノート プレースホルダー 2"/>
+          <p:cNvSpPr>
+            <a:spLocks noGrp="1"/>
+          </p:cNvSpPr>
+          <p:nvPr>
+            <p:ph type="body" idx="1"/>
+          </p:nvPr>
+        </p:nvSpPr>
+        <p:spPr/>
+        <p:txBody>
+          <a:bodyPr/>
+          <a:lstStyle/>
+          <a:p>
+            <a:endParaRPr kumimoji="1" lang="ja-JP" altLang="en-US" dirty="0"/>
+          </a:p>
+        </p:txBody>
+      </p:sp>
+      <p:sp>
+        <p:nvSpPr>
+          <p:cNvPr id="4" name="スライド番号プレースホルダー 3"/>
+          <p:cNvSpPr>
+            <a:spLocks noGrp="1"/>
+          </p:cNvSpPr>
+          <p:nvPr>
+            <p:ph type="sldNum" sz="quarter" idx="10"/>
+          </p:nvPr>
+        </p:nvSpPr>
+        <p:spPr/>
+        <p:txBody>
+          <a:bodyPr/>
+          <a:lstStyle/>
+          <a:p>
+            <a:fld id="{9F1B7F1F-FDAA-480C-AB59-C4CE09E787E7}" type="slidenum">
+              <a:rPr kumimoji="1" lang="ja-JP" altLang="en-US" smtClean="0"/>
+              <a:t>23</a:t>
+            </a:fld>
+            <a:endParaRPr kumimoji="1" lang="ja-JP" altLang="en-US"/>
+          </a:p>
+        </p:txBody>
+      </p:sp>
+    </p:spTree>
+    <p:extLst>
+      <p:ext uri="{BB962C8B-B14F-4D97-AF65-F5344CB8AC3E}">
+        <p14:creationId xmlns:p14="http://schemas.microsoft.com/office/powerpoint/2010/main" val="400695699"/>
+      </p:ext>
+    </p:extLst>
+  </p:cSld>
+  <p:clrMapOvr>
+    <a:masterClrMapping/>
+  </p:clrMapOvr>
+</p:notes>
+</file>
+
 <file path=ppt/notesSlides/notesSlide2.xml><?xml version="1.0" encoding="utf-8"?>
 <p:notes xmlns:a="http://schemas.openxmlformats.org/drawingml/2006/main" xmlns:r="http://schemas.openxmlformats.org/officeDocument/2006/relationships" xmlns:p="http://schemas.openxmlformats.org/presentationml/2006/main">
   <p:cSld>
@@ -1441,7 +1617,7 @@
           <a:p>
             <a:fld id="{22B92BF3-AD3C-41E2-AD5A-4FFB42BC5A7D}" type="datetimeFigureOut">
               <a:rPr kumimoji="1" lang="ja-JP" altLang="en-US" smtClean="0"/>
-              <a:t>2017/8/28</a:t>
+              <a:t>2017/8/31</a:t>
             </a:fld>
             <a:endParaRPr kumimoji="1" lang="ja-JP" altLang="en-US"/>
           </a:p>
@@ -1643,7 +1819,7 @@
           <a:p>
             <a:fld id="{22B92BF3-AD3C-41E2-AD5A-4FFB42BC5A7D}" type="datetimeFigureOut">
               <a:rPr kumimoji="1" lang="ja-JP" altLang="en-US" smtClean="0"/>
-              <a:t>2017/8/28</a:t>
+              <a:t>2017/8/31</a:t>
             </a:fld>
             <a:endParaRPr kumimoji="1" lang="ja-JP" altLang="en-US"/>
           </a:p>
@@ -1855,7 +2031,7 @@
           <a:p>
             <a:fld id="{22B92BF3-AD3C-41E2-AD5A-4FFB42BC5A7D}" type="datetimeFigureOut">
               <a:rPr kumimoji="1" lang="ja-JP" altLang="en-US" smtClean="0"/>
-              <a:t>2017/8/28</a:t>
+              <a:t>2017/8/31</a:t>
             </a:fld>
             <a:endParaRPr kumimoji="1" lang="ja-JP" altLang="en-US"/>
           </a:p>
@@ -2057,7 +2233,7 @@
           <a:p>
             <a:fld id="{22B92BF3-AD3C-41E2-AD5A-4FFB42BC5A7D}" type="datetimeFigureOut">
               <a:rPr kumimoji="1" lang="ja-JP" altLang="en-US" smtClean="0"/>
-              <a:t>2017/8/28</a:t>
+              <a:t>2017/8/31</a:t>
             </a:fld>
             <a:endParaRPr kumimoji="1" lang="ja-JP" altLang="en-US"/>
           </a:p>
@@ -2303,7 +2479,7 @@
           <a:p>
             <a:fld id="{22B92BF3-AD3C-41E2-AD5A-4FFB42BC5A7D}" type="datetimeFigureOut">
               <a:rPr kumimoji="1" lang="ja-JP" altLang="en-US" smtClean="0"/>
-              <a:t>2017/8/28</a:t>
+              <a:t>2017/8/31</a:t>
             </a:fld>
             <a:endParaRPr kumimoji="1" lang="ja-JP" altLang="en-US"/>
           </a:p>
@@ -2599,7 +2775,7 @@
           <a:p>
             <a:fld id="{22B92BF3-AD3C-41E2-AD5A-4FFB42BC5A7D}" type="datetimeFigureOut">
               <a:rPr kumimoji="1" lang="ja-JP" altLang="en-US" smtClean="0"/>
-              <a:t>2017/8/28</a:t>
+              <a:t>2017/8/31</a:t>
             </a:fld>
             <a:endParaRPr kumimoji="1" lang="ja-JP" altLang="en-US"/>
           </a:p>
@@ -3030,7 +3206,7 @@
           <a:p>
             <a:fld id="{22B92BF3-AD3C-41E2-AD5A-4FFB42BC5A7D}" type="datetimeFigureOut">
               <a:rPr kumimoji="1" lang="ja-JP" altLang="en-US" smtClean="0"/>
-              <a:t>2017/8/28</a:t>
+              <a:t>2017/8/31</a:t>
             </a:fld>
             <a:endParaRPr kumimoji="1" lang="ja-JP" altLang="en-US"/>
           </a:p>
@@ -3148,7 +3324,7 @@
           <a:p>
             <a:fld id="{22B92BF3-AD3C-41E2-AD5A-4FFB42BC5A7D}" type="datetimeFigureOut">
               <a:rPr kumimoji="1" lang="ja-JP" altLang="en-US" smtClean="0"/>
-              <a:t>2017/8/28</a:t>
+              <a:t>2017/8/31</a:t>
             </a:fld>
             <a:endParaRPr kumimoji="1" lang="ja-JP" altLang="en-US"/>
           </a:p>
@@ -3243,7 +3419,7 @@
           <a:p>
             <a:fld id="{22B92BF3-AD3C-41E2-AD5A-4FFB42BC5A7D}" type="datetimeFigureOut">
               <a:rPr kumimoji="1" lang="ja-JP" altLang="en-US" smtClean="0"/>
-              <a:t>2017/8/28</a:t>
+              <a:t>2017/8/31</a:t>
             </a:fld>
             <a:endParaRPr kumimoji="1" lang="ja-JP" altLang="en-US"/>
           </a:p>
@@ -3552,7 +3728,7 @@
           <a:p>
             <a:fld id="{22B92BF3-AD3C-41E2-AD5A-4FFB42BC5A7D}" type="datetimeFigureOut">
               <a:rPr kumimoji="1" lang="ja-JP" altLang="en-US" smtClean="0"/>
-              <a:t>2017/8/28</a:t>
+              <a:t>2017/8/31</a:t>
             </a:fld>
             <a:endParaRPr kumimoji="1" lang="ja-JP" altLang="en-US"/>
           </a:p>
@@ -3805,7 +3981,7 @@
           <a:p>
             <a:fld id="{22B92BF3-AD3C-41E2-AD5A-4FFB42BC5A7D}" type="datetimeFigureOut">
               <a:rPr kumimoji="1" lang="ja-JP" altLang="en-US" smtClean="0"/>
-              <a:t>2017/8/28</a:t>
+              <a:t>2017/8/31</a:t>
             </a:fld>
             <a:endParaRPr kumimoji="1" lang="ja-JP" altLang="en-US"/>
           </a:p>
@@ -4050,7 +4226,7 @@
           <a:p>
             <a:fld id="{22B92BF3-AD3C-41E2-AD5A-4FFB42BC5A7D}" type="datetimeFigureOut">
               <a:rPr kumimoji="1" lang="ja-JP" altLang="en-US" smtClean="0"/>
-              <a:t>2017/8/28</a:t>
+              <a:t>2017/8/31</a:t>
             </a:fld>
             <a:endParaRPr kumimoji="1" lang="ja-JP" altLang="en-US"/>
           </a:p>
@@ -12465,6 +12641,13 @@
   <p:clrMapOvr>
     <a:masterClrMapping/>
   </p:clrMapOvr>
+  <p:timing>
+    <p:tnLst>
+      <p:par>
+        <p:cTn id="1" dur="indefinite" restart="never" nodeType="tmRoot"/>
+      </p:par>
+    </p:tnLst>
+  </p:timing>
 </p:sld>
 </file>
 
@@ -16232,6 +16415,13 @@
   <p:clrMapOvr>
     <a:masterClrMapping/>
   </p:clrMapOvr>
+  <p:timing>
+    <p:tnLst>
+      <p:par>
+        <p:cTn id="1" dur="indefinite" restart="never" nodeType="tmRoot"/>
+      </p:par>
+    </p:tnLst>
+  </p:timing>
 </p:sld>
 </file>
 
@@ -23668,6 +23858,2927 @@
 </p:sld>
 </file>
 
+<file path=ppt/slides/slide22.xml><?xml version="1.0" encoding="utf-8"?>
+<p:sld xmlns:a="http://schemas.openxmlformats.org/drawingml/2006/main" xmlns:r="http://schemas.openxmlformats.org/officeDocument/2006/relationships" xmlns:p="http://schemas.openxmlformats.org/presentationml/2006/main">
+  <p:cSld>
+    <p:spTree>
+      <p:nvGrpSpPr>
+        <p:cNvPr id="1" name=""/>
+        <p:cNvGrpSpPr/>
+        <p:nvPr/>
+      </p:nvGrpSpPr>
+      <p:grpSpPr>
+        <a:xfrm>
+          <a:off x="0" y="0"/>
+          <a:ext cx="0" cy="0"/>
+          <a:chOff x="0" y="0"/>
+          <a:chExt cx="0" cy="0"/>
+        </a:xfrm>
+      </p:grpSpPr>
+      <p:sp>
+        <p:nvSpPr>
+          <p:cNvPr id="20" name="角丸四角形 19"/>
+          <p:cNvSpPr/>
+          <p:nvPr/>
+        </p:nvSpPr>
+        <p:spPr>
+          <a:xfrm>
+            <a:off x="0" y="81280"/>
+            <a:ext cx="8676640" cy="6705600"/>
+          </a:xfrm>
+          <a:prstGeom prst="roundRect">
+            <a:avLst/>
+          </a:prstGeom>
+          <a:ln/>
+        </p:spPr>
+        <p:style>
+          <a:lnRef idx="1">
+            <a:schemeClr val="accent5"/>
+          </a:lnRef>
+          <a:fillRef idx="3">
+            <a:schemeClr val="accent5"/>
+          </a:fillRef>
+          <a:effectRef idx="2">
+            <a:schemeClr val="accent5"/>
+          </a:effectRef>
+          <a:fontRef idx="minor">
+            <a:schemeClr val="lt1"/>
+          </a:fontRef>
+        </p:style>
+        <p:txBody>
+          <a:bodyPr rtlCol="0" anchor="ctr"/>
+          <a:lstStyle/>
+          <a:p>
+            <a:pPr algn="ctr"/>
+            <a:endParaRPr lang="en-US" altLang="ja-JP" sz="1600" dirty="0"/>
+          </a:p>
+        </p:txBody>
+      </p:sp>
+      <p:sp>
+        <p:nvSpPr>
+          <p:cNvPr id="5" name="角丸四角形 4"/>
+          <p:cNvSpPr/>
+          <p:nvPr/>
+        </p:nvSpPr>
+        <p:spPr>
+          <a:xfrm>
+            <a:off x="9121251" y="3526691"/>
+            <a:ext cx="2844800" cy="708156"/>
+          </a:xfrm>
+          <a:prstGeom prst="roundRect">
+            <a:avLst/>
+          </a:prstGeom>
+        </p:spPr>
+        <p:style>
+          <a:lnRef idx="1">
+            <a:schemeClr val="accent2"/>
+          </a:lnRef>
+          <a:fillRef idx="3">
+            <a:schemeClr val="accent2"/>
+          </a:fillRef>
+          <a:effectRef idx="2">
+            <a:schemeClr val="accent2"/>
+          </a:effectRef>
+          <a:fontRef idx="minor">
+            <a:schemeClr val="lt1"/>
+          </a:fontRef>
+        </p:style>
+        <p:txBody>
+          <a:bodyPr rtlCol="0" anchor="ctr"/>
+          <a:lstStyle/>
+          <a:p>
+            <a:pPr algn="ctr"/>
+            <a:r>
+              <a:rPr lang="en-US" altLang="ja-JP" sz="1600" dirty="0"/>
+              <a:t>Authorization server</a:t>
+            </a:r>
+          </a:p>
+        </p:txBody>
+      </p:sp>
+      <p:sp>
+        <p:nvSpPr>
+          <p:cNvPr id="73" name="テキスト ボックス 72"/>
+          <p:cNvSpPr txBox="1"/>
+          <p:nvPr/>
+        </p:nvSpPr>
+        <p:spPr>
+          <a:xfrm>
+            <a:off x="7273778" y="6137349"/>
+            <a:ext cx="1009119" cy="369332"/>
+          </a:xfrm>
+          <a:prstGeom prst="rect">
+            <a:avLst/>
+          </a:prstGeom>
+          <a:noFill/>
+        </p:spPr>
+        <p:txBody>
+          <a:bodyPr wrap="square" rtlCol="0">
+            <a:spAutoFit/>
+          </a:bodyPr>
+          <a:lstStyle/>
+          <a:p>
+            <a:r>
+              <a:rPr lang="en-US" altLang="ja-JP" dirty="0" smtClean="0">
+                <a:solidFill>
+                  <a:schemeClr val="bg1"/>
+                </a:solidFill>
+              </a:rPr>
+              <a:t>Client</a:t>
+            </a:r>
+            <a:endParaRPr lang="en-US" altLang="ja-JP" dirty="0">
+              <a:solidFill>
+                <a:schemeClr val="bg1"/>
+              </a:solidFill>
+            </a:endParaRPr>
+          </a:p>
+        </p:txBody>
+      </p:sp>
+      <p:sp>
+        <p:nvSpPr>
+          <p:cNvPr id="51" name="正方形/長方形 50"/>
+          <p:cNvSpPr/>
+          <p:nvPr/>
+        </p:nvSpPr>
+        <p:spPr>
+          <a:xfrm>
+            <a:off x="2801629" y="463890"/>
+            <a:ext cx="3314880" cy="499168"/>
+          </a:xfrm>
+          <a:prstGeom prst="rect">
+            <a:avLst/>
+          </a:prstGeom>
+          <a:effectLst>
+            <a:outerShdw blurRad="50800" dist="38100" dir="2700000" algn="tl" rotWithShape="0">
+              <a:prstClr val="black">
+                <a:alpha val="40000"/>
+              </a:prstClr>
+            </a:outerShdw>
+          </a:effectLst>
+        </p:spPr>
+        <p:style>
+          <a:lnRef idx="1">
+            <a:schemeClr val="accent4"/>
+          </a:lnRef>
+          <a:fillRef idx="2">
+            <a:schemeClr val="accent4"/>
+          </a:fillRef>
+          <a:effectRef idx="1">
+            <a:schemeClr val="accent4"/>
+          </a:effectRef>
+          <a:fontRef idx="minor">
+            <a:schemeClr val="dk1"/>
+          </a:fontRef>
+        </p:style>
+        <p:txBody>
+          <a:bodyPr rtlCol="0" anchor="ctr"/>
+          <a:lstStyle/>
+          <a:p>
+            <a:pPr algn="ctr"/>
+            <a:r>
+              <a:rPr lang="en-US" altLang="ja-JP" dirty="0"/>
+              <a:t>OAuth2RestTemplate</a:t>
+            </a:r>
+          </a:p>
+        </p:txBody>
+      </p:sp>
+      <p:sp>
+        <p:nvSpPr>
+          <p:cNvPr id="32" name="正方形/長方形 31"/>
+          <p:cNvSpPr/>
+          <p:nvPr/>
+        </p:nvSpPr>
+        <p:spPr>
+          <a:xfrm>
+            <a:off x="622466" y="2541456"/>
+            <a:ext cx="3316642" cy="497128"/>
+          </a:xfrm>
+          <a:prstGeom prst="rect">
+            <a:avLst/>
+          </a:prstGeom>
+          <a:effectLst>
+            <a:outerShdw blurRad="50800" dist="38100" dir="2700000" algn="tl" rotWithShape="0">
+              <a:prstClr val="black">
+                <a:alpha val="40000"/>
+              </a:prstClr>
+            </a:outerShdw>
+          </a:effectLst>
+        </p:spPr>
+        <p:style>
+          <a:lnRef idx="1">
+            <a:schemeClr val="accent4"/>
+          </a:lnRef>
+          <a:fillRef idx="2">
+            <a:schemeClr val="accent4"/>
+          </a:fillRef>
+          <a:effectRef idx="1">
+            <a:schemeClr val="accent4"/>
+          </a:effectRef>
+          <a:fontRef idx="minor">
+            <a:schemeClr val="dk1"/>
+          </a:fontRef>
+        </p:style>
+        <p:txBody>
+          <a:bodyPr rtlCol="0" anchor="ctr"/>
+          <a:lstStyle/>
+          <a:p>
+            <a:pPr algn="ctr"/>
+            <a:r>
+              <a:rPr lang="en-US" altLang="ja-JP" dirty="0" smtClean="0"/>
+              <a:t>&lt;&lt;</a:t>
+            </a:r>
+            <a:r>
+              <a:rPr lang="en-US" altLang="ja-JP" dirty="0"/>
+              <a:t>interface</a:t>
+            </a:r>
+            <a:r>
+              <a:rPr lang="en-US" altLang="ja-JP" dirty="0" smtClean="0"/>
+              <a:t>&gt;&gt;</a:t>
+            </a:r>
+          </a:p>
+          <a:p>
+            <a:pPr algn="ctr"/>
+            <a:r>
+              <a:rPr lang="en-US" altLang="ja-JP" dirty="0" err="1" smtClean="0"/>
+              <a:t>AccessTokenProvider</a:t>
+            </a:r>
+            <a:endParaRPr lang="en-US" altLang="ja-JP" dirty="0"/>
+          </a:p>
+        </p:txBody>
+      </p:sp>
+      <p:sp>
+        <p:nvSpPr>
+          <p:cNvPr id="82" name="正方形/長方形 81"/>
+          <p:cNvSpPr/>
+          <p:nvPr/>
+        </p:nvSpPr>
+        <p:spPr>
+          <a:xfrm>
+            <a:off x="4966255" y="1707740"/>
+            <a:ext cx="3316642" cy="497128"/>
+          </a:xfrm>
+          <a:prstGeom prst="rect">
+            <a:avLst/>
+          </a:prstGeom>
+          <a:effectLst>
+            <a:outerShdw blurRad="50800" dist="38100" dir="2700000" algn="tl" rotWithShape="0">
+              <a:prstClr val="black">
+                <a:alpha val="40000"/>
+              </a:prstClr>
+            </a:outerShdw>
+          </a:effectLst>
+        </p:spPr>
+        <p:style>
+          <a:lnRef idx="1">
+            <a:schemeClr val="accent4"/>
+          </a:lnRef>
+          <a:fillRef idx="2">
+            <a:schemeClr val="accent4"/>
+          </a:fillRef>
+          <a:effectRef idx="1">
+            <a:schemeClr val="accent4"/>
+          </a:effectRef>
+          <a:fontRef idx="minor">
+            <a:schemeClr val="dk1"/>
+          </a:fontRef>
+        </p:style>
+        <p:txBody>
+          <a:bodyPr rtlCol="0" anchor="ctr"/>
+          <a:lstStyle/>
+          <a:p>
+            <a:pPr algn="ctr"/>
+            <a:r>
+              <a:rPr lang="en-US" altLang="ja-JP" dirty="0" smtClean="0"/>
+              <a:t>&lt;&lt;</a:t>
+            </a:r>
+            <a:r>
+              <a:rPr lang="en-US" altLang="ja-JP" dirty="0"/>
+              <a:t>interface</a:t>
+            </a:r>
+            <a:r>
+              <a:rPr lang="en-US" altLang="ja-JP" dirty="0" smtClean="0"/>
+              <a:t>&gt;&gt;</a:t>
+            </a:r>
+          </a:p>
+          <a:p>
+            <a:pPr algn="ctr"/>
+            <a:r>
+              <a:rPr lang="en-US" altLang="ja-JP" dirty="0"/>
+              <a:t>OAuth2ProtectedResourceDetails</a:t>
+            </a:r>
+          </a:p>
+        </p:txBody>
+      </p:sp>
+      <p:sp>
+        <p:nvSpPr>
+          <p:cNvPr id="42" name="正方形/長方形 41"/>
+          <p:cNvSpPr/>
+          <p:nvPr/>
+        </p:nvSpPr>
+        <p:spPr>
+          <a:xfrm>
+            <a:off x="622466" y="3486579"/>
+            <a:ext cx="3316642" cy="497128"/>
+          </a:xfrm>
+          <a:prstGeom prst="rect">
+            <a:avLst/>
+          </a:prstGeom>
+          <a:effectLst>
+            <a:outerShdw blurRad="50800" dist="38100" dir="2700000" algn="tl" rotWithShape="0">
+              <a:prstClr val="black">
+                <a:alpha val="40000"/>
+              </a:prstClr>
+            </a:outerShdw>
+          </a:effectLst>
+        </p:spPr>
+        <p:style>
+          <a:lnRef idx="1">
+            <a:schemeClr val="accent4"/>
+          </a:lnRef>
+          <a:fillRef idx="2">
+            <a:schemeClr val="accent4"/>
+          </a:fillRef>
+          <a:effectRef idx="1">
+            <a:schemeClr val="accent4"/>
+          </a:effectRef>
+          <a:fontRef idx="minor">
+            <a:schemeClr val="dk1"/>
+          </a:fontRef>
+        </p:style>
+        <p:txBody>
+          <a:bodyPr rtlCol="0" anchor="ctr"/>
+          <a:lstStyle/>
+          <a:p>
+            <a:pPr algn="ctr"/>
+            <a:r>
+              <a:rPr lang="en-US" altLang="ja-JP" dirty="0" err="1" smtClean="0"/>
+              <a:t>AuthorizationCode</a:t>
+            </a:r>
+            <a:endParaRPr lang="en-US" altLang="ja-JP" dirty="0" smtClean="0"/>
+          </a:p>
+          <a:p>
+            <a:pPr algn="ctr"/>
+            <a:r>
+              <a:rPr lang="en-US" altLang="ja-JP" dirty="0" err="1" smtClean="0"/>
+              <a:t>AccessTokenProvider</a:t>
+            </a:r>
+            <a:endParaRPr lang="en-US" altLang="ja-JP" i="1" dirty="0"/>
+          </a:p>
+        </p:txBody>
+      </p:sp>
+      <p:sp>
+        <p:nvSpPr>
+          <p:cNvPr id="47" name="正方形/長方形 46"/>
+          <p:cNvSpPr/>
+          <p:nvPr/>
+        </p:nvSpPr>
+        <p:spPr>
+          <a:xfrm>
+            <a:off x="650176" y="4868369"/>
+            <a:ext cx="3316642" cy="497128"/>
+          </a:xfrm>
+          <a:prstGeom prst="rect">
+            <a:avLst/>
+          </a:prstGeom>
+          <a:effectLst>
+            <a:outerShdw blurRad="50800" dist="38100" dir="2700000" algn="tl" rotWithShape="0">
+              <a:prstClr val="black">
+                <a:alpha val="40000"/>
+              </a:prstClr>
+            </a:outerShdw>
+          </a:effectLst>
+        </p:spPr>
+        <p:style>
+          <a:lnRef idx="1">
+            <a:schemeClr val="accent4"/>
+          </a:lnRef>
+          <a:fillRef idx="2">
+            <a:schemeClr val="accent4"/>
+          </a:fillRef>
+          <a:effectRef idx="1">
+            <a:schemeClr val="accent4"/>
+          </a:effectRef>
+          <a:fontRef idx="minor">
+            <a:schemeClr val="dk1"/>
+          </a:fontRef>
+        </p:style>
+        <p:txBody>
+          <a:bodyPr rtlCol="0" anchor="ctr"/>
+          <a:lstStyle/>
+          <a:p>
+            <a:pPr algn="ctr"/>
+            <a:r>
+              <a:rPr lang="en-US" altLang="ja-JP" dirty="0" smtClean="0"/>
+              <a:t>&lt;&lt;interface&gt;&gt;</a:t>
+            </a:r>
+          </a:p>
+          <a:p>
+            <a:pPr algn="ctr"/>
+            <a:r>
+              <a:rPr lang="en-US" altLang="ja-JP" dirty="0" err="1"/>
+              <a:t>RequestEnhancer</a:t>
+            </a:r>
+            <a:endParaRPr lang="en-US" altLang="ja-JP" i="1" dirty="0"/>
+          </a:p>
+        </p:txBody>
+      </p:sp>
+      <p:cxnSp>
+        <p:nvCxnSpPr>
+          <p:cNvPr id="55" name="直線矢印コネクタ 54"/>
+          <p:cNvCxnSpPr>
+            <a:stCxn id="42" idx="0"/>
+            <a:endCxn id="32" idx="2"/>
+          </p:cNvCxnSpPr>
+          <p:nvPr/>
+        </p:nvCxnSpPr>
+        <p:spPr>
+          <a:xfrm flipV="1">
+            <a:off x="2280787" y="3038584"/>
+            <a:ext cx="0" cy="447995"/>
+          </a:xfrm>
+          <a:prstGeom prst="straightConnector1">
+            <a:avLst/>
+          </a:prstGeom>
+          <a:ln w="38100">
+            <a:prstDash val="sysDot"/>
+            <a:headEnd type="none"/>
+            <a:tailEnd type="triangle" w="lg" len="lg"/>
+          </a:ln>
+        </p:spPr>
+        <p:style>
+          <a:lnRef idx="2">
+            <a:schemeClr val="dk1"/>
+          </a:lnRef>
+          <a:fillRef idx="0">
+            <a:schemeClr val="dk1"/>
+          </a:fillRef>
+          <a:effectRef idx="1">
+            <a:schemeClr val="dk1"/>
+          </a:effectRef>
+          <a:fontRef idx="minor">
+            <a:schemeClr val="tx1"/>
+          </a:fontRef>
+        </p:style>
+      </p:cxnSp>
+      <p:sp>
+        <p:nvSpPr>
+          <p:cNvPr id="64" name="正方形/長方形 63"/>
+          <p:cNvSpPr/>
+          <p:nvPr/>
+        </p:nvSpPr>
+        <p:spPr>
+          <a:xfrm>
+            <a:off x="4966255" y="4859983"/>
+            <a:ext cx="3316642" cy="497128"/>
+          </a:xfrm>
+          <a:prstGeom prst="rect">
+            <a:avLst/>
+          </a:prstGeom>
+          <a:effectLst>
+            <a:outerShdw blurRad="50800" dist="38100" dir="2700000" algn="tl" rotWithShape="0">
+              <a:prstClr val="black">
+                <a:alpha val="40000"/>
+              </a:prstClr>
+            </a:outerShdw>
+          </a:effectLst>
+        </p:spPr>
+        <p:style>
+          <a:lnRef idx="1">
+            <a:schemeClr val="accent4"/>
+          </a:lnRef>
+          <a:fillRef idx="2">
+            <a:schemeClr val="accent4"/>
+          </a:fillRef>
+          <a:effectRef idx="1">
+            <a:schemeClr val="accent4"/>
+          </a:effectRef>
+          <a:fontRef idx="minor">
+            <a:schemeClr val="dk1"/>
+          </a:fontRef>
+        </p:style>
+        <p:txBody>
+          <a:bodyPr rtlCol="0" anchor="ctr"/>
+          <a:lstStyle/>
+          <a:p>
+            <a:pPr algn="ctr"/>
+            <a:r>
+              <a:rPr lang="en-US" altLang="ja-JP" dirty="0" smtClean="0"/>
+              <a:t>&lt;&lt;interface&gt;&gt;</a:t>
+            </a:r>
+          </a:p>
+          <a:p>
+            <a:pPr algn="ctr"/>
+            <a:r>
+              <a:rPr lang="en-US" altLang="ja-JP" dirty="0" err="1"/>
+              <a:t>ClientAuthenticationHandler</a:t>
+            </a:r>
+            <a:endParaRPr lang="en-US" altLang="ja-JP" dirty="0"/>
+          </a:p>
+        </p:txBody>
+      </p:sp>
+      <p:cxnSp>
+        <p:nvCxnSpPr>
+          <p:cNvPr id="74" name="直線矢印コネクタ 73"/>
+          <p:cNvCxnSpPr/>
+          <p:nvPr/>
+        </p:nvCxnSpPr>
+        <p:spPr>
+          <a:xfrm>
+            <a:off x="4140725" y="3714680"/>
+            <a:ext cx="4980526" cy="0"/>
+          </a:xfrm>
+          <a:prstGeom prst="straightConnector1">
+            <a:avLst/>
+          </a:prstGeom>
+          <a:ln w="38100">
+            <a:headEnd type="arrow"/>
+            <a:tailEnd type="none"/>
+          </a:ln>
+        </p:spPr>
+        <p:style>
+          <a:lnRef idx="2">
+            <a:schemeClr val="dk1"/>
+          </a:lnRef>
+          <a:fillRef idx="0">
+            <a:schemeClr val="dk1"/>
+          </a:fillRef>
+          <a:effectRef idx="1">
+            <a:schemeClr val="dk1"/>
+          </a:effectRef>
+          <a:fontRef idx="minor">
+            <a:schemeClr val="tx1"/>
+          </a:fontRef>
+        </p:style>
+      </p:cxnSp>
+      <p:sp>
+        <p:nvSpPr>
+          <p:cNvPr id="76" name="正方形/長方形 75"/>
+          <p:cNvSpPr/>
+          <p:nvPr/>
+        </p:nvSpPr>
+        <p:spPr>
+          <a:xfrm>
+            <a:off x="4966255" y="2651988"/>
+            <a:ext cx="3316642" cy="497128"/>
+          </a:xfrm>
+          <a:prstGeom prst="rect">
+            <a:avLst/>
+          </a:prstGeom>
+          <a:effectLst>
+            <a:outerShdw blurRad="50800" dist="38100" dir="2700000" algn="tl" rotWithShape="0">
+              <a:prstClr val="black">
+                <a:alpha val="40000"/>
+              </a:prstClr>
+            </a:outerShdw>
+          </a:effectLst>
+        </p:spPr>
+        <p:style>
+          <a:lnRef idx="1">
+            <a:schemeClr val="accent4"/>
+          </a:lnRef>
+          <a:fillRef idx="2">
+            <a:schemeClr val="accent4"/>
+          </a:fillRef>
+          <a:effectRef idx="1">
+            <a:schemeClr val="accent4"/>
+          </a:effectRef>
+          <a:fontRef idx="minor">
+            <a:schemeClr val="dk1"/>
+          </a:fontRef>
+        </p:style>
+        <p:txBody>
+          <a:bodyPr rtlCol="0" anchor="ctr"/>
+          <a:lstStyle/>
+          <a:p>
+            <a:pPr algn="ctr"/>
+            <a:r>
+              <a:rPr lang="en-US" altLang="ja-JP" dirty="0" err="1" smtClean="0"/>
+              <a:t>AuthorizationCode</a:t>
+            </a:r>
+            <a:endParaRPr lang="en-US" altLang="ja-JP" dirty="0" smtClean="0"/>
+          </a:p>
+          <a:p>
+            <a:pPr algn="ctr"/>
+            <a:r>
+              <a:rPr lang="en-US" altLang="ja-JP" dirty="0" err="1" smtClean="0"/>
+              <a:t>ResourceDetails</a:t>
+            </a:r>
+            <a:endParaRPr lang="en-US" altLang="ja-JP" dirty="0"/>
+          </a:p>
+        </p:txBody>
+      </p:sp>
+      <p:cxnSp>
+        <p:nvCxnSpPr>
+          <p:cNvPr id="81" name="直線矢印コネクタ 80"/>
+          <p:cNvCxnSpPr>
+            <a:stCxn id="76" idx="0"/>
+            <a:endCxn id="82" idx="2"/>
+          </p:cNvCxnSpPr>
+          <p:nvPr/>
+        </p:nvCxnSpPr>
+        <p:spPr>
+          <a:xfrm flipV="1">
+            <a:off x="6624576" y="2204868"/>
+            <a:ext cx="0" cy="447120"/>
+          </a:xfrm>
+          <a:prstGeom prst="straightConnector1">
+            <a:avLst/>
+          </a:prstGeom>
+          <a:ln w="38100">
+            <a:prstDash val="sysDot"/>
+            <a:headEnd type="none"/>
+            <a:tailEnd type="triangle" w="lg" len="lg"/>
+          </a:ln>
+        </p:spPr>
+        <p:style>
+          <a:lnRef idx="2">
+            <a:schemeClr val="dk1"/>
+          </a:lnRef>
+          <a:fillRef idx="0">
+            <a:schemeClr val="dk1"/>
+          </a:fillRef>
+          <a:effectRef idx="1">
+            <a:schemeClr val="dk1"/>
+          </a:effectRef>
+          <a:fontRef idx="minor">
+            <a:schemeClr val="tx1"/>
+          </a:fontRef>
+        </p:style>
+      </p:cxnSp>
+      <p:cxnSp>
+        <p:nvCxnSpPr>
+          <p:cNvPr id="90" name="カギ線コネクタ 89"/>
+          <p:cNvCxnSpPr>
+            <a:stCxn id="51" idx="2"/>
+            <a:endCxn id="53" idx="0"/>
+          </p:cNvCxnSpPr>
+          <p:nvPr/>
+        </p:nvCxnSpPr>
+        <p:spPr>
+          <a:xfrm rot="16200000" flipH="1">
+            <a:off x="5261647" y="160479"/>
+            <a:ext cx="596151" cy="2201307"/>
+          </a:xfrm>
+          <a:prstGeom prst="bentConnector3">
+            <a:avLst>
+              <a:gd name="adj1" fmla="val 50000"/>
+            </a:avLst>
+          </a:prstGeom>
+          <a:ln w="38100">
+            <a:tailEnd type="arrow"/>
+          </a:ln>
+        </p:spPr>
+        <p:style>
+          <a:lnRef idx="2">
+            <a:schemeClr val="dk1"/>
+          </a:lnRef>
+          <a:fillRef idx="0">
+            <a:schemeClr val="dk1"/>
+          </a:fillRef>
+          <a:effectRef idx="1">
+            <a:schemeClr val="dk1"/>
+          </a:effectRef>
+          <a:fontRef idx="minor">
+            <a:schemeClr val="tx1"/>
+          </a:fontRef>
+        </p:style>
+      </p:cxnSp>
+      <p:cxnSp>
+        <p:nvCxnSpPr>
+          <p:cNvPr id="95" name="カギ線コネクタ 94"/>
+          <p:cNvCxnSpPr>
+            <a:stCxn id="51" idx="2"/>
+            <a:endCxn id="24" idx="0"/>
+          </p:cNvCxnSpPr>
+          <p:nvPr/>
+        </p:nvCxnSpPr>
+        <p:spPr>
+          <a:xfrm rot="5400000">
+            <a:off x="2694109" y="567912"/>
+            <a:ext cx="1369814" cy="2160106"/>
+          </a:xfrm>
+          <a:prstGeom prst="bentConnector3">
+            <a:avLst>
+              <a:gd name="adj1" fmla="val 50000"/>
+            </a:avLst>
+          </a:prstGeom>
+          <a:ln w="38100">
+            <a:tailEnd type="arrow"/>
+          </a:ln>
+        </p:spPr>
+        <p:style>
+          <a:lnRef idx="2">
+            <a:schemeClr val="dk1"/>
+          </a:lnRef>
+          <a:fillRef idx="0">
+            <a:schemeClr val="dk1"/>
+          </a:fillRef>
+          <a:effectRef idx="1">
+            <a:schemeClr val="dk1"/>
+          </a:effectRef>
+          <a:fontRef idx="minor">
+            <a:schemeClr val="tx1"/>
+          </a:fontRef>
+        </p:style>
+      </p:cxnSp>
+      <p:cxnSp>
+        <p:nvCxnSpPr>
+          <p:cNvPr id="134" name="カギ線コネクタ 133"/>
+          <p:cNvCxnSpPr>
+            <a:stCxn id="24" idx="2"/>
+            <a:endCxn id="64" idx="0"/>
+          </p:cNvCxnSpPr>
+          <p:nvPr/>
+        </p:nvCxnSpPr>
+        <p:spPr>
+          <a:xfrm rot="16200000" flipH="1">
+            <a:off x="4152474" y="2387881"/>
+            <a:ext cx="618590" cy="4325613"/>
+          </a:xfrm>
+          <a:prstGeom prst="bentConnector3">
+            <a:avLst>
+              <a:gd name="adj1" fmla="val 50000"/>
+            </a:avLst>
+          </a:prstGeom>
+          <a:ln w="38100">
+            <a:tailEnd type="arrow"/>
+          </a:ln>
+        </p:spPr>
+        <p:style>
+          <a:lnRef idx="2">
+            <a:schemeClr val="dk1"/>
+          </a:lnRef>
+          <a:fillRef idx="0">
+            <a:schemeClr val="dk1"/>
+          </a:fillRef>
+          <a:effectRef idx="1">
+            <a:schemeClr val="dk1"/>
+          </a:effectRef>
+          <a:fontRef idx="minor">
+            <a:schemeClr val="tx1"/>
+          </a:fontRef>
+        </p:style>
+      </p:cxnSp>
+      <p:sp>
+        <p:nvSpPr>
+          <p:cNvPr id="146" name="角丸四角形 145"/>
+          <p:cNvSpPr/>
+          <p:nvPr/>
+        </p:nvSpPr>
+        <p:spPr>
+          <a:xfrm>
+            <a:off x="9121251" y="363817"/>
+            <a:ext cx="2844800" cy="699313"/>
+          </a:xfrm>
+          <a:prstGeom prst="roundRect">
+            <a:avLst/>
+          </a:prstGeom>
+        </p:spPr>
+        <p:style>
+          <a:lnRef idx="1">
+            <a:schemeClr val="accent4"/>
+          </a:lnRef>
+          <a:fillRef idx="3">
+            <a:schemeClr val="accent4"/>
+          </a:fillRef>
+          <a:effectRef idx="2">
+            <a:schemeClr val="accent4"/>
+          </a:effectRef>
+          <a:fontRef idx="minor">
+            <a:schemeClr val="lt1"/>
+          </a:fontRef>
+        </p:style>
+        <p:txBody>
+          <a:bodyPr rtlCol="0" anchor="ctr"/>
+          <a:lstStyle/>
+          <a:p>
+            <a:pPr algn="ctr"/>
+            <a:r>
+              <a:rPr lang="en-US" altLang="ja-JP" sz="1600" dirty="0">
+                <a:solidFill>
+                  <a:schemeClr val="bg1"/>
+                </a:solidFill>
+              </a:rPr>
+              <a:t>Resource </a:t>
+            </a:r>
+            <a:r>
+              <a:rPr lang="en-US" altLang="ja-JP" sz="1600" dirty="0" smtClean="0">
+                <a:solidFill>
+                  <a:schemeClr val="bg1"/>
+                </a:solidFill>
+              </a:rPr>
+              <a:t>server</a:t>
+            </a:r>
+            <a:endParaRPr lang="en-US" altLang="ja-JP" sz="1600" dirty="0">
+              <a:solidFill>
+                <a:schemeClr val="bg1"/>
+              </a:solidFill>
+            </a:endParaRPr>
+          </a:p>
+        </p:txBody>
+      </p:sp>
+      <p:cxnSp>
+        <p:nvCxnSpPr>
+          <p:cNvPr id="147" name="直線矢印コネクタ 146"/>
+          <p:cNvCxnSpPr>
+            <a:stCxn id="51" idx="3"/>
+            <a:endCxn id="146" idx="1"/>
+          </p:cNvCxnSpPr>
+          <p:nvPr/>
+        </p:nvCxnSpPr>
+        <p:spPr>
+          <a:xfrm>
+            <a:off x="6116509" y="713474"/>
+            <a:ext cx="3004742" cy="0"/>
+          </a:xfrm>
+          <a:prstGeom prst="straightConnector1">
+            <a:avLst/>
+          </a:prstGeom>
+          <a:ln w="38100">
+            <a:tailEnd type="arrow"/>
+          </a:ln>
+        </p:spPr>
+        <p:style>
+          <a:lnRef idx="2">
+            <a:schemeClr val="dk1"/>
+          </a:lnRef>
+          <a:fillRef idx="0">
+            <a:schemeClr val="dk1"/>
+          </a:fillRef>
+          <a:effectRef idx="1">
+            <a:schemeClr val="dk1"/>
+          </a:effectRef>
+          <a:fontRef idx="minor">
+            <a:schemeClr val="tx1"/>
+          </a:fontRef>
+        </p:style>
+      </p:cxnSp>
+      <p:sp>
+        <p:nvSpPr>
+          <p:cNvPr id="35" name="テキスト ボックス 34"/>
+          <p:cNvSpPr txBox="1"/>
+          <p:nvPr/>
+        </p:nvSpPr>
+        <p:spPr>
+          <a:xfrm>
+            <a:off x="2788773" y="446671"/>
+            <a:ext cx="719090" cy="369332"/>
+          </a:xfrm>
+          <a:prstGeom prst="rect">
+            <a:avLst/>
+          </a:prstGeom>
+          <a:noFill/>
+        </p:spPr>
+        <p:txBody>
+          <a:bodyPr wrap="square" rtlCol="0">
+            <a:spAutoFit/>
+          </a:bodyPr>
+          <a:lstStyle/>
+          <a:p>
+            <a:r>
+              <a:rPr lang="en-US" altLang="ja-JP" dirty="0" smtClean="0"/>
+              <a:t>(1)</a:t>
+            </a:r>
+            <a:endParaRPr lang="en-US" altLang="ja-JP" dirty="0"/>
+          </a:p>
+        </p:txBody>
+      </p:sp>
+      <p:sp>
+        <p:nvSpPr>
+          <p:cNvPr id="36" name="テキスト ボックス 35"/>
+          <p:cNvSpPr txBox="1"/>
+          <p:nvPr/>
+        </p:nvSpPr>
+        <p:spPr>
+          <a:xfrm>
+            <a:off x="4049412" y="1076466"/>
+            <a:ext cx="719090" cy="369332"/>
+          </a:xfrm>
+          <a:prstGeom prst="rect">
+            <a:avLst/>
+          </a:prstGeom>
+          <a:noFill/>
+        </p:spPr>
+        <p:txBody>
+          <a:bodyPr wrap="square" rtlCol="0">
+            <a:spAutoFit/>
+          </a:bodyPr>
+          <a:lstStyle/>
+          <a:p>
+            <a:r>
+              <a:rPr lang="en-US" altLang="ja-JP" dirty="0" smtClean="0">
+                <a:solidFill>
+                  <a:schemeClr val="bg1"/>
+                </a:solidFill>
+              </a:rPr>
+              <a:t>(2)</a:t>
+            </a:r>
+            <a:endParaRPr lang="en-US" altLang="ja-JP" dirty="0">
+              <a:solidFill>
+                <a:schemeClr val="bg1"/>
+              </a:solidFill>
+            </a:endParaRPr>
+          </a:p>
+        </p:txBody>
+      </p:sp>
+      <p:sp>
+        <p:nvSpPr>
+          <p:cNvPr id="40" name="テキスト ボックス 39"/>
+          <p:cNvSpPr txBox="1"/>
+          <p:nvPr/>
+        </p:nvSpPr>
+        <p:spPr>
+          <a:xfrm>
+            <a:off x="1812847" y="4353281"/>
+            <a:ext cx="719090" cy="369332"/>
+          </a:xfrm>
+          <a:prstGeom prst="rect">
+            <a:avLst/>
+          </a:prstGeom>
+          <a:noFill/>
+        </p:spPr>
+        <p:txBody>
+          <a:bodyPr wrap="square" rtlCol="0">
+            <a:spAutoFit/>
+          </a:bodyPr>
+          <a:lstStyle/>
+          <a:p>
+            <a:r>
+              <a:rPr lang="en-US" altLang="ja-JP" dirty="0" smtClean="0">
+                <a:solidFill>
+                  <a:schemeClr val="bg1"/>
+                </a:solidFill>
+              </a:rPr>
+              <a:t>(3)</a:t>
+            </a:r>
+            <a:endParaRPr lang="en-US" altLang="ja-JP" dirty="0">
+              <a:solidFill>
+                <a:schemeClr val="bg1"/>
+              </a:solidFill>
+            </a:endParaRPr>
+          </a:p>
+        </p:txBody>
+      </p:sp>
+      <p:sp>
+        <p:nvSpPr>
+          <p:cNvPr id="41" name="テキスト ボックス 40"/>
+          <p:cNvSpPr txBox="1"/>
+          <p:nvPr/>
+        </p:nvSpPr>
+        <p:spPr>
+          <a:xfrm>
+            <a:off x="8142593" y="4079745"/>
+            <a:ext cx="719090" cy="369332"/>
+          </a:xfrm>
+          <a:prstGeom prst="rect">
+            <a:avLst/>
+          </a:prstGeom>
+          <a:noFill/>
+        </p:spPr>
+        <p:txBody>
+          <a:bodyPr wrap="square" rtlCol="0">
+            <a:spAutoFit/>
+          </a:bodyPr>
+          <a:lstStyle/>
+          <a:p>
+            <a:r>
+              <a:rPr lang="en-US" altLang="ja-JP" dirty="0" smtClean="0">
+                <a:solidFill>
+                  <a:schemeClr val="bg1"/>
+                </a:solidFill>
+              </a:rPr>
+              <a:t>(4)</a:t>
+            </a:r>
+            <a:endParaRPr lang="en-US" altLang="ja-JP" dirty="0">
+              <a:solidFill>
+                <a:schemeClr val="bg1"/>
+              </a:solidFill>
+            </a:endParaRPr>
+          </a:p>
+        </p:txBody>
+      </p:sp>
+      <p:sp>
+        <p:nvSpPr>
+          <p:cNvPr id="43" name="テキスト ボックス 42"/>
+          <p:cNvSpPr txBox="1"/>
+          <p:nvPr/>
+        </p:nvSpPr>
+        <p:spPr>
+          <a:xfrm>
+            <a:off x="4284566" y="3330338"/>
+            <a:ext cx="719090" cy="369332"/>
+          </a:xfrm>
+          <a:prstGeom prst="rect">
+            <a:avLst/>
+          </a:prstGeom>
+          <a:noFill/>
+        </p:spPr>
+        <p:txBody>
+          <a:bodyPr wrap="square" rtlCol="0">
+            <a:spAutoFit/>
+          </a:bodyPr>
+          <a:lstStyle/>
+          <a:p>
+            <a:r>
+              <a:rPr lang="en-US" altLang="ja-JP" dirty="0" smtClean="0">
+                <a:solidFill>
+                  <a:schemeClr val="bg1"/>
+                </a:solidFill>
+              </a:rPr>
+              <a:t>(5)</a:t>
+            </a:r>
+            <a:endParaRPr lang="en-US" altLang="ja-JP" dirty="0">
+              <a:solidFill>
+                <a:schemeClr val="bg1"/>
+              </a:solidFill>
+            </a:endParaRPr>
+          </a:p>
+        </p:txBody>
+      </p:sp>
+      <p:sp>
+        <p:nvSpPr>
+          <p:cNvPr id="24" name="正方形/長方形 23"/>
+          <p:cNvSpPr/>
+          <p:nvPr/>
+        </p:nvSpPr>
+        <p:spPr>
+          <a:xfrm>
+            <a:off x="457200" y="2332872"/>
+            <a:ext cx="3683525" cy="1908521"/>
+          </a:xfrm>
+          <a:prstGeom prst="rect">
+            <a:avLst/>
+          </a:prstGeom>
+          <a:noFill/>
+          <a:ln w="57150">
+            <a:solidFill>
+              <a:srgbClr val="F7D6D3"/>
+            </a:solidFill>
+          </a:ln>
+        </p:spPr>
+        <p:style>
+          <a:lnRef idx="1">
+            <a:schemeClr val="accent2"/>
+          </a:lnRef>
+          <a:fillRef idx="2">
+            <a:schemeClr val="accent2"/>
+          </a:fillRef>
+          <a:effectRef idx="1">
+            <a:schemeClr val="accent2"/>
+          </a:effectRef>
+          <a:fontRef idx="minor">
+            <a:schemeClr val="dk1"/>
+          </a:fontRef>
+        </p:style>
+        <p:txBody>
+          <a:bodyPr rtlCol="0" anchor="ctr"/>
+          <a:lstStyle/>
+          <a:p>
+            <a:pPr algn="ctr"/>
+            <a:endParaRPr kumimoji="1" lang="ja-JP" altLang="en-US"/>
+          </a:p>
+        </p:txBody>
+      </p:sp>
+      <p:sp>
+        <p:nvSpPr>
+          <p:cNvPr id="53" name="正方形/長方形 52"/>
+          <p:cNvSpPr/>
+          <p:nvPr/>
+        </p:nvSpPr>
+        <p:spPr>
+          <a:xfrm>
+            <a:off x="4818613" y="1559209"/>
+            <a:ext cx="3683525" cy="1911256"/>
+          </a:xfrm>
+          <a:prstGeom prst="rect">
+            <a:avLst/>
+          </a:prstGeom>
+          <a:noFill/>
+          <a:ln w="57150">
+            <a:solidFill>
+              <a:srgbClr val="F7D6D3"/>
+            </a:solidFill>
+          </a:ln>
+        </p:spPr>
+        <p:style>
+          <a:lnRef idx="1">
+            <a:schemeClr val="accent2"/>
+          </a:lnRef>
+          <a:fillRef idx="2">
+            <a:schemeClr val="accent2"/>
+          </a:fillRef>
+          <a:effectRef idx="1">
+            <a:schemeClr val="accent2"/>
+          </a:effectRef>
+          <a:fontRef idx="minor">
+            <a:schemeClr val="dk1"/>
+          </a:fontRef>
+        </p:style>
+        <p:txBody>
+          <a:bodyPr rtlCol="0" anchor="ctr"/>
+          <a:lstStyle/>
+          <a:p>
+            <a:pPr algn="ctr"/>
+            <a:endParaRPr kumimoji="1" lang="ja-JP" altLang="en-US"/>
+          </a:p>
+        </p:txBody>
+      </p:sp>
+      <p:cxnSp>
+        <p:nvCxnSpPr>
+          <p:cNvPr id="37" name="直線矢印コネクタ 36"/>
+          <p:cNvCxnSpPr>
+            <a:stCxn id="24" idx="2"/>
+            <a:endCxn id="86" idx="0"/>
+          </p:cNvCxnSpPr>
+          <p:nvPr/>
+        </p:nvCxnSpPr>
+        <p:spPr>
+          <a:xfrm>
+            <a:off x="2298963" y="4241393"/>
+            <a:ext cx="4767" cy="524238"/>
+          </a:xfrm>
+          <a:prstGeom prst="straightConnector1">
+            <a:avLst/>
+          </a:prstGeom>
+          <a:ln w="38100">
+            <a:headEnd type="none"/>
+            <a:tailEnd type="arrow"/>
+          </a:ln>
+        </p:spPr>
+        <p:style>
+          <a:lnRef idx="2">
+            <a:schemeClr val="dk1"/>
+          </a:lnRef>
+          <a:fillRef idx="0">
+            <a:schemeClr val="dk1"/>
+          </a:fillRef>
+          <a:effectRef idx="1">
+            <a:schemeClr val="dk1"/>
+          </a:effectRef>
+          <a:fontRef idx="minor">
+            <a:schemeClr val="tx1"/>
+          </a:fontRef>
+        </p:style>
+      </p:cxnSp>
+      <p:sp>
+        <p:nvSpPr>
+          <p:cNvPr id="70" name="正方形/長方形 69"/>
+          <p:cNvSpPr/>
+          <p:nvPr/>
+        </p:nvSpPr>
+        <p:spPr>
+          <a:xfrm>
+            <a:off x="650176" y="5743438"/>
+            <a:ext cx="3316642" cy="497128"/>
+          </a:xfrm>
+          <a:prstGeom prst="rect">
+            <a:avLst/>
+          </a:prstGeom>
+          <a:effectLst>
+            <a:outerShdw blurRad="50800" dist="38100" dir="2700000" algn="tl" rotWithShape="0">
+              <a:prstClr val="black">
+                <a:alpha val="40000"/>
+              </a:prstClr>
+            </a:outerShdw>
+          </a:effectLst>
+        </p:spPr>
+        <p:style>
+          <a:lnRef idx="1">
+            <a:schemeClr val="accent4"/>
+          </a:lnRef>
+          <a:fillRef idx="2">
+            <a:schemeClr val="accent4"/>
+          </a:fillRef>
+          <a:effectRef idx="1">
+            <a:schemeClr val="accent4"/>
+          </a:effectRef>
+          <a:fontRef idx="minor">
+            <a:schemeClr val="dk1"/>
+          </a:fontRef>
+        </p:style>
+        <p:txBody>
+          <a:bodyPr rtlCol="0" anchor="ctr"/>
+          <a:lstStyle/>
+          <a:p>
+            <a:pPr algn="ctr"/>
+            <a:r>
+              <a:rPr lang="en-US" altLang="ja-JP" dirty="0" err="1"/>
+              <a:t>DefaultRequestEnhancer</a:t>
+            </a:r>
+            <a:endParaRPr lang="en-US" altLang="ja-JP" i="1" dirty="0"/>
+          </a:p>
+        </p:txBody>
+      </p:sp>
+      <p:cxnSp>
+        <p:nvCxnSpPr>
+          <p:cNvPr id="71" name="直線矢印コネクタ 70"/>
+          <p:cNvCxnSpPr>
+            <a:stCxn id="70" idx="0"/>
+            <a:endCxn id="47" idx="2"/>
+          </p:cNvCxnSpPr>
+          <p:nvPr/>
+        </p:nvCxnSpPr>
+        <p:spPr>
+          <a:xfrm flipV="1">
+            <a:off x="2308497" y="5365497"/>
+            <a:ext cx="0" cy="377941"/>
+          </a:xfrm>
+          <a:prstGeom prst="straightConnector1">
+            <a:avLst/>
+          </a:prstGeom>
+          <a:ln w="38100">
+            <a:prstDash val="sysDot"/>
+            <a:headEnd type="none"/>
+            <a:tailEnd type="triangle" w="lg" len="lg"/>
+          </a:ln>
+        </p:spPr>
+        <p:style>
+          <a:lnRef idx="2">
+            <a:schemeClr val="dk1"/>
+          </a:lnRef>
+          <a:fillRef idx="0">
+            <a:schemeClr val="dk1"/>
+          </a:fillRef>
+          <a:effectRef idx="1">
+            <a:schemeClr val="dk1"/>
+          </a:effectRef>
+          <a:fontRef idx="minor">
+            <a:schemeClr val="tx1"/>
+          </a:fontRef>
+        </p:style>
+      </p:cxnSp>
+      <p:sp>
+        <p:nvSpPr>
+          <p:cNvPr id="86" name="正方形/長方形 85"/>
+          <p:cNvSpPr/>
+          <p:nvPr/>
+        </p:nvSpPr>
+        <p:spPr>
+          <a:xfrm>
+            <a:off x="461967" y="4765631"/>
+            <a:ext cx="3683525" cy="1621990"/>
+          </a:xfrm>
+          <a:prstGeom prst="rect">
+            <a:avLst/>
+          </a:prstGeom>
+          <a:noFill/>
+          <a:ln w="57150">
+            <a:solidFill>
+              <a:srgbClr val="F7D6D3"/>
+            </a:solidFill>
+          </a:ln>
+        </p:spPr>
+        <p:style>
+          <a:lnRef idx="1">
+            <a:schemeClr val="accent2"/>
+          </a:lnRef>
+          <a:fillRef idx="2">
+            <a:schemeClr val="accent2"/>
+          </a:fillRef>
+          <a:effectRef idx="1">
+            <a:schemeClr val="accent2"/>
+          </a:effectRef>
+          <a:fontRef idx="minor">
+            <a:schemeClr val="dk1"/>
+          </a:fontRef>
+        </p:style>
+        <p:txBody>
+          <a:bodyPr rtlCol="0" anchor="ctr"/>
+          <a:lstStyle/>
+          <a:p>
+            <a:pPr algn="ctr"/>
+            <a:endParaRPr kumimoji="1" lang="ja-JP" altLang="en-US"/>
+          </a:p>
+        </p:txBody>
+      </p:sp>
+      <p:cxnSp>
+        <p:nvCxnSpPr>
+          <p:cNvPr id="45" name="直線矢印コネクタ 44"/>
+          <p:cNvCxnSpPr/>
+          <p:nvPr/>
+        </p:nvCxnSpPr>
+        <p:spPr>
+          <a:xfrm>
+            <a:off x="4140725" y="4044671"/>
+            <a:ext cx="4980526" cy="0"/>
+          </a:xfrm>
+          <a:prstGeom prst="straightConnector1">
+            <a:avLst/>
+          </a:prstGeom>
+          <a:ln w="38100">
+            <a:tailEnd type="arrow"/>
+          </a:ln>
+        </p:spPr>
+        <p:style>
+          <a:lnRef idx="2">
+            <a:schemeClr val="dk1"/>
+          </a:lnRef>
+          <a:fillRef idx="0">
+            <a:schemeClr val="dk1"/>
+          </a:fillRef>
+          <a:effectRef idx="1">
+            <a:schemeClr val="dk1"/>
+          </a:effectRef>
+          <a:fontRef idx="minor">
+            <a:schemeClr val="tx1"/>
+          </a:fontRef>
+        </p:style>
+      </p:cxnSp>
+      <p:cxnSp>
+        <p:nvCxnSpPr>
+          <p:cNvPr id="46" name="カギ線コネクタ 45"/>
+          <p:cNvCxnSpPr>
+            <a:endCxn id="51" idx="1"/>
+          </p:cNvCxnSpPr>
+          <p:nvPr/>
+        </p:nvCxnSpPr>
+        <p:spPr>
+          <a:xfrm rot="5400000" flipH="1" flipV="1">
+            <a:off x="1267857" y="780723"/>
+            <a:ext cx="1601021" cy="1466524"/>
+          </a:xfrm>
+          <a:prstGeom prst="bentConnector2">
+            <a:avLst/>
+          </a:prstGeom>
+          <a:ln w="38100">
+            <a:tailEnd type="arrow"/>
+          </a:ln>
+        </p:spPr>
+        <p:style>
+          <a:lnRef idx="2">
+            <a:schemeClr val="dk1"/>
+          </a:lnRef>
+          <a:fillRef idx="0">
+            <a:schemeClr val="dk1"/>
+          </a:fillRef>
+          <a:effectRef idx="1">
+            <a:schemeClr val="dk1"/>
+          </a:effectRef>
+          <a:fontRef idx="minor">
+            <a:schemeClr val="tx1"/>
+          </a:fontRef>
+        </p:style>
+      </p:cxnSp>
+      <p:sp>
+        <p:nvSpPr>
+          <p:cNvPr id="34" name="テキスト ボックス 33"/>
+          <p:cNvSpPr txBox="1"/>
+          <p:nvPr/>
+        </p:nvSpPr>
+        <p:spPr>
+          <a:xfrm>
+            <a:off x="882009" y="1855600"/>
+            <a:ext cx="719090" cy="369332"/>
+          </a:xfrm>
+          <a:prstGeom prst="rect">
+            <a:avLst/>
+          </a:prstGeom>
+          <a:noFill/>
+        </p:spPr>
+        <p:txBody>
+          <a:bodyPr wrap="square" rtlCol="0">
+            <a:spAutoFit/>
+          </a:bodyPr>
+          <a:lstStyle/>
+          <a:p>
+            <a:r>
+              <a:rPr lang="en-US" altLang="ja-JP" dirty="0" smtClean="0">
+                <a:solidFill>
+                  <a:schemeClr val="bg1"/>
+                </a:solidFill>
+              </a:rPr>
+              <a:t>(6)</a:t>
+            </a:r>
+            <a:endParaRPr lang="en-US" altLang="ja-JP" dirty="0">
+              <a:solidFill>
+                <a:schemeClr val="bg1"/>
+              </a:solidFill>
+            </a:endParaRPr>
+          </a:p>
+        </p:txBody>
+      </p:sp>
+      <p:sp>
+        <p:nvSpPr>
+          <p:cNvPr id="38" name="テキスト ボックス 37"/>
+          <p:cNvSpPr txBox="1"/>
+          <p:nvPr/>
+        </p:nvSpPr>
+        <p:spPr>
+          <a:xfrm>
+            <a:off x="6116509" y="202374"/>
+            <a:ext cx="719090" cy="369332"/>
+          </a:xfrm>
+          <a:prstGeom prst="rect">
+            <a:avLst/>
+          </a:prstGeom>
+          <a:noFill/>
+        </p:spPr>
+        <p:txBody>
+          <a:bodyPr wrap="square" rtlCol="0">
+            <a:spAutoFit/>
+          </a:bodyPr>
+          <a:lstStyle/>
+          <a:p>
+            <a:r>
+              <a:rPr lang="en-US" altLang="ja-JP" dirty="0" smtClean="0">
+                <a:solidFill>
+                  <a:schemeClr val="bg1"/>
+                </a:solidFill>
+              </a:rPr>
+              <a:t>(6)’</a:t>
+            </a:r>
+            <a:endParaRPr lang="en-US" altLang="ja-JP" dirty="0">
+              <a:solidFill>
+                <a:schemeClr val="bg1"/>
+              </a:solidFill>
+            </a:endParaRPr>
+          </a:p>
+        </p:txBody>
+      </p:sp>
+    </p:spTree>
+    <p:extLst>
+      <p:ext uri="{BB962C8B-B14F-4D97-AF65-F5344CB8AC3E}">
+        <p14:creationId xmlns:p14="http://schemas.microsoft.com/office/powerpoint/2010/main" val="313282989"/>
+      </p:ext>
+    </p:extLst>
+  </p:cSld>
+  <p:clrMapOvr>
+    <a:masterClrMapping/>
+  </p:clrMapOvr>
+  <p:timing>
+    <p:tnLst>
+      <p:par>
+        <p:cTn id="1" dur="indefinite" restart="never" nodeType="tmRoot"/>
+      </p:par>
+    </p:tnLst>
+  </p:timing>
+</p:sld>
+</file>
+
+<file path=ppt/slides/slide23.xml><?xml version="1.0" encoding="utf-8"?>
+<p:sld xmlns:a="http://schemas.openxmlformats.org/drawingml/2006/main" xmlns:r="http://schemas.openxmlformats.org/officeDocument/2006/relationships" xmlns:p="http://schemas.openxmlformats.org/presentationml/2006/main">
+  <p:cSld>
+    <p:spTree>
+      <p:nvGrpSpPr>
+        <p:cNvPr id="1" name=""/>
+        <p:cNvGrpSpPr/>
+        <p:nvPr/>
+      </p:nvGrpSpPr>
+      <p:grpSpPr>
+        <a:xfrm>
+          <a:off x="0" y="0"/>
+          <a:ext cx="0" cy="0"/>
+          <a:chOff x="0" y="0"/>
+          <a:chExt cx="0" cy="0"/>
+        </a:xfrm>
+      </p:grpSpPr>
+      <p:sp>
+        <p:nvSpPr>
+          <p:cNvPr id="8" name="角丸四角形 7"/>
+          <p:cNvSpPr/>
+          <p:nvPr/>
+        </p:nvSpPr>
+        <p:spPr>
+          <a:xfrm>
+            <a:off x="553320" y="1249451"/>
+            <a:ext cx="11414561" cy="5060163"/>
+          </a:xfrm>
+          <a:prstGeom prst="roundRect">
+            <a:avLst/>
+          </a:prstGeom>
+        </p:spPr>
+        <p:style>
+          <a:lnRef idx="1">
+            <a:schemeClr val="accent2"/>
+          </a:lnRef>
+          <a:fillRef idx="3">
+            <a:schemeClr val="accent2"/>
+          </a:fillRef>
+          <a:effectRef idx="2">
+            <a:schemeClr val="accent2"/>
+          </a:effectRef>
+          <a:fontRef idx="minor">
+            <a:schemeClr val="lt1"/>
+          </a:fontRef>
+        </p:style>
+        <p:txBody>
+          <a:bodyPr rtlCol="0" anchor="ctr"/>
+          <a:lstStyle/>
+          <a:p>
+            <a:pPr algn="ctr"/>
+            <a:endParaRPr lang="en-US" altLang="ja-JP" sz="1600" dirty="0"/>
+          </a:p>
+        </p:txBody>
+      </p:sp>
+      <p:sp>
+        <p:nvSpPr>
+          <p:cNvPr id="73" name="テキスト ボックス 72"/>
+          <p:cNvSpPr txBox="1"/>
+          <p:nvPr/>
+        </p:nvSpPr>
+        <p:spPr>
+          <a:xfrm>
+            <a:off x="9159414" y="5967660"/>
+            <a:ext cx="2200826" cy="369332"/>
+          </a:xfrm>
+          <a:prstGeom prst="rect">
+            <a:avLst/>
+          </a:prstGeom>
+          <a:noFill/>
+        </p:spPr>
+        <p:txBody>
+          <a:bodyPr wrap="square" rtlCol="0">
+            <a:spAutoFit/>
+          </a:bodyPr>
+          <a:lstStyle/>
+          <a:p>
+            <a:r>
+              <a:rPr lang="en-US" altLang="ja-JP" dirty="0">
+                <a:solidFill>
+                  <a:schemeClr val="bg1"/>
+                </a:solidFill>
+              </a:rPr>
+              <a:t>Authorization </a:t>
+            </a:r>
+            <a:r>
+              <a:rPr lang="en-US" altLang="ja-JP" dirty="0" smtClean="0">
+                <a:solidFill>
+                  <a:schemeClr val="bg1"/>
+                </a:solidFill>
+              </a:rPr>
+              <a:t>server</a:t>
+            </a:r>
+            <a:endParaRPr lang="en-US" altLang="ja-JP" dirty="0">
+              <a:solidFill>
+                <a:schemeClr val="bg1"/>
+              </a:solidFill>
+            </a:endParaRPr>
+          </a:p>
+        </p:txBody>
+      </p:sp>
+      <p:sp>
+        <p:nvSpPr>
+          <p:cNvPr id="7" name="角丸四角形 6"/>
+          <p:cNvSpPr/>
+          <p:nvPr/>
+        </p:nvSpPr>
+        <p:spPr>
+          <a:xfrm>
+            <a:off x="1426482" y="598133"/>
+            <a:ext cx="1835555" cy="514620"/>
+          </a:xfrm>
+          <a:prstGeom prst="roundRect">
+            <a:avLst/>
+          </a:prstGeom>
+          <a:ln/>
+        </p:spPr>
+        <p:style>
+          <a:lnRef idx="1">
+            <a:schemeClr val="accent5"/>
+          </a:lnRef>
+          <a:fillRef idx="3">
+            <a:schemeClr val="accent5"/>
+          </a:fillRef>
+          <a:effectRef idx="2">
+            <a:schemeClr val="accent5"/>
+          </a:effectRef>
+          <a:fontRef idx="minor">
+            <a:schemeClr val="lt1"/>
+          </a:fontRef>
+        </p:style>
+        <p:txBody>
+          <a:bodyPr rtlCol="0" anchor="ctr"/>
+          <a:lstStyle/>
+          <a:p>
+            <a:pPr algn="ctr"/>
+            <a:r>
+              <a:rPr lang="en-US" altLang="ja-JP" sz="1600" dirty="0" smtClean="0"/>
+              <a:t>Client</a:t>
+            </a:r>
+            <a:endParaRPr lang="en-US" altLang="ja-JP" sz="1600" dirty="0"/>
+          </a:p>
+        </p:txBody>
+      </p:sp>
+      <p:sp>
+        <p:nvSpPr>
+          <p:cNvPr id="62" name="正方形/長方形 61"/>
+          <p:cNvSpPr/>
+          <p:nvPr/>
+        </p:nvSpPr>
+        <p:spPr>
+          <a:xfrm>
+            <a:off x="8440990" y="3900744"/>
+            <a:ext cx="2989234" cy="499064"/>
+          </a:xfrm>
+          <a:prstGeom prst="rect">
+            <a:avLst/>
+          </a:prstGeom>
+          <a:effectLst>
+            <a:outerShdw blurRad="50800" dist="38100" dir="2700000" algn="tl" rotWithShape="0">
+              <a:prstClr val="black">
+                <a:alpha val="40000"/>
+              </a:prstClr>
+            </a:outerShdw>
+          </a:effectLst>
+        </p:spPr>
+        <p:style>
+          <a:lnRef idx="1">
+            <a:schemeClr val="accent4"/>
+          </a:lnRef>
+          <a:fillRef idx="2">
+            <a:schemeClr val="accent4"/>
+          </a:fillRef>
+          <a:effectRef idx="1">
+            <a:schemeClr val="accent4"/>
+          </a:effectRef>
+          <a:fontRef idx="minor">
+            <a:schemeClr val="dk1"/>
+          </a:fontRef>
+        </p:style>
+        <p:txBody>
+          <a:bodyPr rtlCol="0" anchor="ctr"/>
+          <a:lstStyle/>
+          <a:p>
+            <a:pPr algn="ctr"/>
+            <a:r>
+              <a:rPr lang="en-US" altLang="ja-JP" dirty="0" err="1"/>
+              <a:t>DefaultTokenServices</a:t>
+            </a:r>
+            <a:endParaRPr lang="en-US" altLang="ja-JP" dirty="0"/>
+          </a:p>
+        </p:txBody>
+      </p:sp>
+      <p:sp>
+        <p:nvSpPr>
+          <p:cNvPr id="63" name="正方形/長方形 62"/>
+          <p:cNvSpPr/>
+          <p:nvPr/>
+        </p:nvSpPr>
+        <p:spPr>
+          <a:xfrm>
+            <a:off x="849644" y="2646751"/>
+            <a:ext cx="2989232" cy="499064"/>
+          </a:xfrm>
+          <a:prstGeom prst="rect">
+            <a:avLst/>
+          </a:prstGeom>
+          <a:effectLst>
+            <a:outerShdw blurRad="50800" dist="38100" dir="2700000" algn="tl" rotWithShape="0">
+              <a:prstClr val="black">
+                <a:alpha val="40000"/>
+              </a:prstClr>
+            </a:outerShdw>
+          </a:effectLst>
+        </p:spPr>
+        <p:style>
+          <a:lnRef idx="1">
+            <a:schemeClr val="accent4"/>
+          </a:lnRef>
+          <a:fillRef idx="2">
+            <a:schemeClr val="accent4"/>
+          </a:fillRef>
+          <a:effectRef idx="1">
+            <a:schemeClr val="accent4"/>
+          </a:effectRef>
+          <a:fontRef idx="minor">
+            <a:schemeClr val="dk1"/>
+          </a:fontRef>
+        </p:style>
+        <p:txBody>
+          <a:bodyPr rtlCol="0" anchor="ctr"/>
+          <a:lstStyle/>
+          <a:p>
+            <a:pPr algn="ctr"/>
+            <a:r>
+              <a:rPr lang="en-US" altLang="ja-JP" dirty="0" err="1"/>
+              <a:t>TokenEndpoint</a:t>
+            </a:r>
+            <a:endParaRPr lang="en-US" altLang="ja-JP" dirty="0"/>
+          </a:p>
+        </p:txBody>
+      </p:sp>
+      <p:sp>
+        <p:nvSpPr>
+          <p:cNvPr id="65" name="正方形/長方形 64"/>
+          <p:cNvSpPr/>
+          <p:nvPr/>
+        </p:nvSpPr>
+        <p:spPr>
+          <a:xfrm>
+            <a:off x="4584142" y="2646751"/>
+            <a:ext cx="2995583" cy="499064"/>
+          </a:xfrm>
+          <a:prstGeom prst="rect">
+            <a:avLst/>
+          </a:prstGeom>
+          <a:effectLst>
+            <a:outerShdw blurRad="50800" dist="38100" dir="2700000" algn="tl" rotWithShape="0">
+              <a:prstClr val="black">
+                <a:alpha val="40000"/>
+              </a:prstClr>
+            </a:outerShdw>
+          </a:effectLst>
+        </p:spPr>
+        <p:style>
+          <a:lnRef idx="1">
+            <a:schemeClr val="accent4"/>
+          </a:lnRef>
+          <a:fillRef idx="2">
+            <a:schemeClr val="accent4"/>
+          </a:fillRef>
+          <a:effectRef idx="1">
+            <a:schemeClr val="accent4"/>
+          </a:effectRef>
+          <a:fontRef idx="minor">
+            <a:schemeClr val="dk1"/>
+          </a:fontRef>
+        </p:style>
+        <p:txBody>
+          <a:bodyPr rtlCol="0" anchor="ctr"/>
+          <a:lstStyle/>
+          <a:p>
+            <a:pPr algn="ctr"/>
+            <a:r>
+              <a:rPr lang="en-US" altLang="ja-JP" dirty="0" smtClean="0"/>
+              <a:t>&lt;&lt;interface&gt;&gt;</a:t>
+            </a:r>
+          </a:p>
+          <a:p>
+            <a:pPr algn="ctr"/>
+            <a:r>
+              <a:rPr lang="en-US" altLang="ja-JP" dirty="0" err="1" smtClean="0"/>
+              <a:t>TokenGranter</a:t>
+            </a:r>
+            <a:endParaRPr lang="en-US" altLang="ja-JP" dirty="0"/>
+          </a:p>
+        </p:txBody>
+      </p:sp>
+      <p:sp>
+        <p:nvSpPr>
+          <p:cNvPr id="70" name="正方形/長方形 69"/>
+          <p:cNvSpPr/>
+          <p:nvPr/>
+        </p:nvSpPr>
+        <p:spPr>
+          <a:xfrm>
+            <a:off x="8163622" y="3035394"/>
+            <a:ext cx="3524872" cy="499064"/>
+          </a:xfrm>
+          <a:prstGeom prst="rect">
+            <a:avLst/>
+          </a:prstGeom>
+          <a:effectLst>
+            <a:outerShdw blurRad="50800" dist="38100" dir="2700000" algn="tl" rotWithShape="0">
+              <a:prstClr val="black">
+                <a:alpha val="40000"/>
+              </a:prstClr>
+            </a:outerShdw>
+          </a:effectLst>
+        </p:spPr>
+        <p:style>
+          <a:lnRef idx="1">
+            <a:schemeClr val="accent4"/>
+          </a:lnRef>
+          <a:fillRef idx="2">
+            <a:schemeClr val="accent4"/>
+          </a:fillRef>
+          <a:effectRef idx="1">
+            <a:schemeClr val="accent4"/>
+          </a:effectRef>
+          <a:fontRef idx="minor">
+            <a:schemeClr val="dk1"/>
+          </a:fontRef>
+        </p:style>
+        <p:txBody>
+          <a:bodyPr rtlCol="0" anchor="ctr"/>
+          <a:lstStyle/>
+          <a:p>
+            <a:pPr algn="ctr"/>
+            <a:r>
+              <a:rPr lang="en-US" altLang="ja-JP" dirty="0" smtClean="0"/>
+              <a:t>&lt;&lt;interface&gt;&gt;</a:t>
+            </a:r>
+          </a:p>
+          <a:p>
+            <a:pPr algn="ctr"/>
+            <a:r>
+              <a:rPr lang="en-US" altLang="ja-JP" dirty="0" err="1" smtClean="0"/>
+              <a:t>AuthorizationServerTokenServices</a:t>
+            </a:r>
+            <a:endParaRPr lang="en-US" altLang="ja-JP" dirty="0"/>
+          </a:p>
+        </p:txBody>
+      </p:sp>
+      <p:sp>
+        <p:nvSpPr>
+          <p:cNvPr id="92" name="正方形/長方形 91"/>
+          <p:cNvSpPr/>
+          <p:nvPr/>
+        </p:nvSpPr>
+        <p:spPr>
+          <a:xfrm>
+            <a:off x="8475282" y="5149794"/>
+            <a:ext cx="2989232" cy="499064"/>
+          </a:xfrm>
+          <a:prstGeom prst="rect">
+            <a:avLst/>
+          </a:prstGeom>
+          <a:effectLst>
+            <a:outerShdw blurRad="50800" dist="38100" dir="2700000" algn="tl" rotWithShape="0">
+              <a:prstClr val="black">
+                <a:alpha val="40000"/>
+              </a:prstClr>
+            </a:outerShdw>
+          </a:effectLst>
+        </p:spPr>
+        <p:style>
+          <a:lnRef idx="1">
+            <a:schemeClr val="accent4"/>
+          </a:lnRef>
+          <a:fillRef idx="2">
+            <a:schemeClr val="accent4"/>
+          </a:fillRef>
+          <a:effectRef idx="1">
+            <a:schemeClr val="accent4"/>
+          </a:effectRef>
+          <a:fontRef idx="minor">
+            <a:schemeClr val="dk1"/>
+          </a:fontRef>
+        </p:style>
+        <p:txBody>
+          <a:bodyPr rtlCol="0" anchor="ctr"/>
+          <a:lstStyle/>
+          <a:p>
+            <a:pPr algn="ctr"/>
+            <a:r>
+              <a:rPr lang="en-US" altLang="ja-JP" dirty="0" smtClean="0"/>
+              <a:t>&lt;&lt;interface&gt;&gt;</a:t>
+            </a:r>
+          </a:p>
+          <a:p>
+            <a:pPr algn="ctr"/>
+            <a:r>
+              <a:rPr lang="en-US" altLang="ja-JP" dirty="0" err="1" smtClean="0"/>
+              <a:t>TokenStore</a:t>
+            </a:r>
+            <a:endParaRPr lang="en-US" altLang="ja-JP" dirty="0"/>
+          </a:p>
+        </p:txBody>
+      </p:sp>
+      <p:sp>
+        <p:nvSpPr>
+          <p:cNvPr id="36" name="正方形/長方形 35"/>
+          <p:cNvSpPr/>
+          <p:nvPr/>
+        </p:nvSpPr>
+        <p:spPr>
+          <a:xfrm>
+            <a:off x="802925" y="1599665"/>
+            <a:ext cx="3668948" cy="456073"/>
+          </a:xfrm>
+          <a:prstGeom prst="rect">
+            <a:avLst/>
+          </a:prstGeom>
+          <a:effectLst>
+            <a:outerShdw blurRad="50800" dist="38100" dir="2700000" algn="tl" rotWithShape="0">
+              <a:prstClr val="black">
+                <a:alpha val="40000"/>
+              </a:prstClr>
+            </a:outerShdw>
+          </a:effectLst>
+        </p:spPr>
+        <p:style>
+          <a:lnRef idx="1">
+            <a:schemeClr val="accent2"/>
+          </a:lnRef>
+          <a:fillRef idx="2">
+            <a:schemeClr val="accent2"/>
+          </a:fillRef>
+          <a:effectRef idx="1">
+            <a:schemeClr val="accent2"/>
+          </a:effectRef>
+          <a:fontRef idx="minor">
+            <a:schemeClr val="dk1"/>
+          </a:fontRef>
+        </p:style>
+        <p:txBody>
+          <a:bodyPr rtlCol="0" anchor="ctr"/>
+          <a:lstStyle/>
+          <a:p>
+            <a:pPr algn="ctr"/>
+            <a:endParaRPr lang="ja-JP" altLang="en-US"/>
+          </a:p>
+        </p:txBody>
+      </p:sp>
+      <p:sp>
+        <p:nvSpPr>
+          <p:cNvPr id="37" name="テキスト ボックス 36"/>
+          <p:cNvSpPr txBox="1"/>
+          <p:nvPr/>
+        </p:nvSpPr>
+        <p:spPr>
+          <a:xfrm>
+            <a:off x="2481530" y="1642131"/>
+            <a:ext cx="1677988" cy="369332"/>
+          </a:xfrm>
+          <a:prstGeom prst="rect">
+            <a:avLst/>
+          </a:prstGeom>
+          <a:noFill/>
+        </p:spPr>
+        <p:txBody>
+          <a:bodyPr wrap="square" rtlCol="0">
+            <a:spAutoFit/>
+          </a:bodyPr>
+          <a:lstStyle/>
+          <a:p>
+            <a:r>
+              <a:rPr lang="en-US" altLang="ja-JP" dirty="0" smtClean="0"/>
+              <a:t>Spring Security</a:t>
+            </a:r>
+            <a:endParaRPr lang="en-US" altLang="ja-JP" dirty="0"/>
+          </a:p>
+        </p:txBody>
+      </p:sp>
+      <p:cxnSp>
+        <p:nvCxnSpPr>
+          <p:cNvPr id="186" name="直線矢印コネクタ 185"/>
+          <p:cNvCxnSpPr>
+            <a:stCxn id="7" idx="2"/>
+            <a:endCxn id="63" idx="0"/>
+          </p:cNvCxnSpPr>
+          <p:nvPr/>
+        </p:nvCxnSpPr>
+        <p:spPr>
+          <a:xfrm>
+            <a:off x="2344260" y="1112753"/>
+            <a:ext cx="0" cy="1533998"/>
+          </a:xfrm>
+          <a:prstGeom prst="straightConnector1">
+            <a:avLst/>
+          </a:prstGeom>
+          <a:ln w="38100">
+            <a:tailEnd type="arrow"/>
+          </a:ln>
+        </p:spPr>
+        <p:style>
+          <a:lnRef idx="2">
+            <a:schemeClr val="dk1"/>
+          </a:lnRef>
+          <a:fillRef idx="0">
+            <a:schemeClr val="dk1"/>
+          </a:fillRef>
+          <a:effectRef idx="1">
+            <a:schemeClr val="dk1"/>
+          </a:effectRef>
+          <a:fontRef idx="minor">
+            <a:schemeClr val="tx1"/>
+          </a:fontRef>
+        </p:style>
+      </p:cxnSp>
+      <p:sp>
+        <p:nvSpPr>
+          <p:cNvPr id="48" name="正方形/長方形 47"/>
+          <p:cNvSpPr/>
+          <p:nvPr/>
+        </p:nvSpPr>
+        <p:spPr>
+          <a:xfrm>
+            <a:off x="8349306" y="2015423"/>
+            <a:ext cx="2989232" cy="499064"/>
+          </a:xfrm>
+          <a:prstGeom prst="rect">
+            <a:avLst/>
+          </a:prstGeom>
+          <a:effectLst>
+            <a:outerShdw blurRad="50800" dist="38100" dir="2700000" algn="tl" rotWithShape="0">
+              <a:prstClr val="black">
+                <a:alpha val="40000"/>
+              </a:prstClr>
+            </a:outerShdw>
+          </a:effectLst>
+        </p:spPr>
+        <p:style>
+          <a:lnRef idx="1">
+            <a:schemeClr val="accent4"/>
+          </a:lnRef>
+          <a:fillRef idx="2">
+            <a:schemeClr val="accent4"/>
+          </a:fillRef>
+          <a:effectRef idx="1">
+            <a:schemeClr val="accent4"/>
+          </a:effectRef>
+          <a:fontRef idx="minor">
+            <a:schemeClr val="dk1"/>
+          </a:fontRef>
+        </p:style>
+        <p:txBody>
+          <a:bodyPr rtlCol="0" anchor="ctr"/>
+          <a:lstStyle/>
+          <a:p>
+            <a:pPr algn="ctr"/>
+            <a:r>
+              <a:rPr lang="en-US" altLang="ja-JP" dirty="0"/>
+              <a:t>&lt;&lt;interface&gt;&gt;</a:t>
+            </a:r>
+          </a:p>
+          <a:p>
+            <a:pPr algn="ctr"/>
+            <a:r>
+              <a:rPr lang="en-US" altLang="ja-JP" dirty="0" err="1" smtClean="0"/>
+              <a:t>ClientDetailsService</a:t>
+            </a:r>
+            <a:endParaRPr lang="en-US" altLang="ja-JP" dirty="0"/>
+          </a:p>
+        </p:txBody>
+      </p:sp>
+      <p:sp>
+        <p:nvSpPr>
+          <p:cNvPr id="60" name="正方形/長方形 59"/>
+          <p:cNvSpPr/>
+          <p:nvPr/>
+        </p:nvSpPr>
+        <p:spPr>
+          <a:xfrm>
+            <a:off x="4587317" y="3713084"/>
+            <a:ext cx="2989232" cy="530456"/>
+          </a:xfrm>
+          <a:prstGeom prst="rect">
+            <a:avLst/>
+          </a:prstGeom>
+          <a:effectLst>
+            <a:outerShdw blurRad="50800" dist="38100" dir="2700000" algn="tl" rotWithShape="0">
+              <a:prstClr val="black">
+                <a:alpha val="40000"/>
+              </a:prstClr>
+            </a:outerShdw>
+          </a:effectLst>
+        </p:spPr>
+        <p:style>
+          <a:lnRef idx="1">
+            <a:schemeClr val="accent4"/>
+          </a:lnRef>
+          <a:fillRef idx="2">
+            <a:schemeClr val="accent4"/>
+          </a:fillRef>
+          <a:effectRef idx="1">
+            <a:schemeClr val="accent4"/>
+          </a:effectRef>
+          <a:fontRef idx="minor">
+            <a:schemeClr val="dk1"/>
+          </a:fontRef>
+        </p:style>
+        <p:txBody>
+          <a:bodyPr rtlCol="0" anchor="ctr"/>
+          <a:lstStyle/>
+          <a:p>
+            <a:pPr algn="ctr"/>
+            <a:r>
+              <a:rPr lang="en-US" altLang="ja-JP" dirty="0" err="1" smtClean="0"/>
+              <a:t>AuthorizationCode</a:t>
+            </a:r>
+            <a:endParaRPr lang="en-US" altLang="ja-JP" dirty="0" smtClean="0"/>
+          </a:p>
+          <a:p>
+            <a:pPr algn="ctr"/>
+            <a:r>
+              <a:rPr lang="en-US" altLang="ja-JP" dirty="0" err="1" smtClean="0"/>
+              <a:t>TokenGranter</a:t>
+            </a:r>
+            <a:endParaRPr lang="en-US" altLang="ja-JP" dirty="0"/>
+          </a:p>
+        </p:txBody>
+      </p:sp>
+      <p:sp>
+        <p:nvSpPr>
+          <p:cNvPr id="66" name="正方形/長方形 65"/>
+          <p:cNvSpPr/>
+          <p:nvPr/>
+        </p:nvSpPr>
+        <p:spPr>
+          <a:xfrm>
+            <a:off x="849643" y="3701850"/>
+            <a:ext cx="2989232" cy="530456"/>
+          </a:xfrm>
+          <a:prstGeom prst="rect">
+            <a:avLst/>
+          </a:prstGeom>
+          <a:effectLst>
+            <a:outerShdw blurRad="50800" dist="38100" dir="2700000" algn="tl" rotWithShape="0">
+              <a:prstClr val="black">
+                <a:alpha val="40000"/>
+              </a:prstClr>
+            </a:outerShdw>
+          </a:effectLst>
+        </p:spPr>
+        <p:style>
+          <a:lnRef idx="1">
+            <a:schemeClr val="accent4"/>
+          </a:lnRef>
+          <a:fillRef idx="2">
+            <a:schemeClr val="accent4"/>
+          </a:fillRef>
+          <a:effectRef idx="1">
+            <a:schemeClr val="accent4"/>
+          </a:effectRef>
+          <a:fontRef idx="minor">
+            <a:schemeClr val="dk1"/>
+          </a:fontRef>
+        </p:style>
+        <p:txBody>
+          <a:bodyPr rtlCol="0" anchor="ctr"/>
+          <a:lstStyle/>
+          <a:p>
+            <a:pPr algn="ctr"/>
+            <a:r>
+              <a:rPr lang="en-US" altLang="ja-JP" dirty="0"/>
+              <a:t>&lt;&lt;interface&gt;&gt;</a:t>
+            </a:r>
+          </a:p>
+          <a:p>
+            <a:pPr algn="ctr"/>
+            <a:r>
+              <a:rPr lang="en-US" altLang="ja-JP" dirty="0" err="1" smtClean="0"/>
+              <a:t>AuthorizationCodeServices</a:t>
+            </a:r>
+            <a:endParaRPr lang="en-US" altLang="ja-JP" dirty="0"/>
+          </a:p>
+        </p:txBody>
+      </p:sp>
+      <p:cxnSp>
+        <p:nvCxnSpPr>
+          <p:cNvPr id="84" name="カギ線コネクタ 83"/>
+          <p:cNvCxnSpPr>
+            <a:stCxn id="63" idx="3"/>
+          </p:cNvCxnSpPr>
+          <p:nvPr/>
+        </p:nvCxnSpPr>
+        <p:spPr>
+          <a:xfrm>
+            <a:off x="3838876" y="2896283"/>
+            <a:ext cx="632997" cy="2696"/>
+          </a:xfrm>
+          <a:prstGeom prst="straightConnector1">
+            <a:avLst/>
+          </a:prstGeom>
+          <a:ln w="38100">
+            <a:tailEnd type="arrow"/>
+          </a:ln>
+        </p:spPr>
+        <p:style>
+          <a:lnRef idx="2">
+            <a:schemeClr val="dk1"/>
+          </a:lnRef>
+          <a:fillRef idx="0">
+            <a:schemeClr val="dk1"/>
+          </a:fillRef>
+          <a:effectRef idx="1">
+            <a:schemeClr val="dk1"/>
+          </a:effectRef>
+          <a:fontRef idx="minor">
+            <a:schemeClr val="tx1"/>
+          </a:fontRef>
+        </p:style>
+      </p:cxnSp>
+      <p:cxnSp>
+        <p:nvCxnSpPr>
+          <p:cNvPr id="88" name="カギ線コネクタ 87"/>
+          <p:cNvCxnSpPr>
+            <a:stCxn id="60" idx="0"/>
+            <a:endCxn id="65" idx="2"/>
+          </p:cNvCxnSpPr>
+          <p:nvPr/>
+        </p:nvCxnSpPr>
+        <p:spPr>
+          <a:xfrm flipV="1">
+            <a:off x="6081933" y="3145815"/>
+            <a:ext cx="1" cy="567269"/>
+          </a:xfrm>
+          <a:prstGeom prst="straightConnector1">
+            <a:avLst/>
+          </a:prstGeom>
+          <a:ln w="38100">
+            <a:prstDash val="sysDot"/>
+            <a:headEnd type="none"/>
+            <a:tailEnd type="triangle" w="lg" len="lg"/>
+          </a:ln>
+        </p:spPr>
+        <p:style>
+          <a:lnRef idx="2">
+            <a:schemeClr val="dk1"/>
+          </a:lnRef>
+          <a:fillRef idx="0">
+            <a:schemeClr val="dk1"/>
+          </a:fillRef>
+          <a:effectRef idx="1">
+            <a:schemeClr val="dk1"/>
+          </a:effectRef>
+          <a:fontRef idx="minor">
+            <a:schemeClr val="tx1"/>
+          </a:fontRef>
+        </p:style>
+      </p:cxnSp>
+      <p:cxnSp>
+        <p:nvCxnSpPr>
+          <p:cNvPr id="101" name="カギ線コネクタ 100"/>
+          <p:cNvCxnSpPr/>
+          <p:nvPr/>
+        </p:nvCxnSpPr>
+        <p:spPr>
+          <a:xfrm flipH="1">
+            <a:off x="3838875" y="3875086"/>
+            <a:ext cx="619195" cy="0"/>
+          </a:xfrm>
+          <a:prstGeom prst="straightConnector1">
+            <a:avLst/>
+          </a:prstGeom>
+          <a:ln w="38100">
+            <a:tailEnd type="arrow"/>
+          </a:ln>
+        </p:spPr>
+        <p:style>
+          <a:lnRef idx="2">
+            <a:schemeClr val="dk1"/>
+          </a:lnRef>
+          <a:fillRef idx="0">
+            <a:schemeClr val="dk1"/>
+          </a:fillRef>
+          <a:effectRef idx="1">
+            <a:schemeClr val="dk1"/>
+          </a:effectRef>
+          <a:fontRef idx="minor">
+            <a:schemeClr val="tx1"/>
+          </a:fontRef>
+        </p:style>
+      </p:cxnSp>
+      <p:cxnSp>
+        <p:nvCxnSpPr>
+          <p:cNvPr id="107" name="カギ線コネクタ 106"/>
+          <p:cNvCxnSpPr/>
+          <p:nvPr/>
+        </p:nvCxnSpPr>
+        <p:spPr>
+          <a:xfrm>
+            <a:off x="7699447" y="3534118"/>
+            <a:ext cx="417274" cy="0"/>
+          </a:xfrm>
+          <a:prstGeom prst="straightConnector1">
+            <a:avLst/>
+          </a:prstGeom>
+          <a:ln w="38100">
+            <a:tailEnd type="arrow"/>
+          </a:ln>
+        </p:spPr>
+        <p:style>
+          <a:lnRef idx="2">
+            <a:schemeClr val="dk1"/>
+          </a:lnRef>
+          <a:fillRef idx="0">
+            <a:schemeClr val="dk1"/>
+          </a:fillRef>
+          <a:effectRef idx="1">
+            <a:schemeClr val="dk1"/>
+          </a:effectRef>
+          <a:fontRef idx="minor">
+            <a:schemeClr val="tx1"/>
+          </a:fontRef>
+        </p:style>
+      </p:cxnSp>
+      <p:cxnSp>
+        <p:nvCxnSpPr>
+          <p:cNvPr id="109" name="カギ線コネクタ 108"/>
+          <p:cNvCxnSpPr>
+            <a:stCxn id="45" idx="3"/>
+            <a:endCxn id="48" idx="1"/>
+          </p:cNvCxnSpPr>
+          <p:nvPr/>
+        </p:nvCxnSpPr>
+        <p:spPr>
+          <a:xfrm flipV="1">
+            <a:off x="7699447" y="2264955"/>
+            <a:ext cx="649859" cy="1261143"/>
+          </a:xfrm>
+          <a:prstGeom prst="bentConnector3">
+            <a:avLst>
+              <a:gd name="adj1" fmla="val 23617"/>
+            </a:avLst>
+          </a:prstGeom>
+          <a:ln w="38100">
+            <a:tailEnd type="arrow"/>
+          </a:ln>
+        </p:spPr>
+        <p:style>
+          <a:lnRef idx="2">
+            <a:schemeClr val="dk1"/>
+          </a:lnRef>
+          <a:fillRef idx="0">
+            <a:schemeClr val="dk1"/>
+          </a:fillRef>
+          <a:effectRef idx="1">
+            <a:schemeClr val="dk1"/>
+          </a:effectRef>
+          <a:fontRef idx="minor">
+            <a:schemeClr val="tx1"/>
+          </a:fontRef>
+        </p:style>
+      </p:cxnSp>
+      <p:cxnSp>
+        <p:nvCxnSpPr>
+          <p:cNvPr id="115" name="カギ線コネクタ 114"/>
+          <p:cNvCxnSpPr>
+            <a:stCxn id="62" idx="0"/>
+            <a:endCxn id="70" idx="2"/>
+          </p:cNvCxnSpPr>
+          <p:nvPr/>
+        </p:nvCxnSpPr>
+        <p:spPr>
+          <a:xfrm flipH="1" flipV="1">
+            <a:off x="9926058" y="3534458"/>
+            <a:ext cx="9549" cy="366286"/>
+          </a:xfrm>
+          <a:prstGeom prst="straightConnector1">
+            <a:avLst/>
+          </a:prstGeom>
+          <a:ln w="38100">
+            <a:prstDash val="sysDot"/>
+            <a:headEnd type="none"/>
+            <a:tailEnd type="triangle" w="lg" len="lg"/>
+          </a:ln>
+        </p:spPr>
+        <p:style>
+          <a:lnRef idx="2">
+            <a:schemeClr val="dk1"/>
+          </a:lnRef>
+          <a:fillRef idx="0">
+            <a:schemeClr val="dk1"/>
+          </a:fillRef>
+          <a:effectRef idx="1">
+            <a:schemeClr val="dk1"/>
+          </a:effectRef>
+          <a:fontRef idx="minor">
+            <a:schemeClr val="tx1"/>
+          </a:fontRef>
+        </p:style>
+      </p:cxnSp>
+      <p:cxnSp>
+        <p:nvCxnSpPr>
+          <p:cNvPr id="134" name="カギ線コネクタ 133"/>
+          <p:cNvCxnSpPr>
+            <a:stCxn id="67" idx="2"/>
+            <a:endCxn id="92" idx="0"/>
+          </p:cNvCxnSpPr>
+          <p:nvPr/>
+        </p:nvCxnSpPr>
+        <p:spPr>
+          <a:xfrm>
+            <a:off x="9959072" y="4531345"/>
+            <a:ext cx="10826" cy="618449"/>
+          </a:xfrm>
+          <a:prstGeom prst="straightConnector1">
+            <a:avLst/>
+          </a:prstGeom>
+          <a:ln w="38100">
+            <a:tailEnd type="arrow"/>
+          </a:ln>
+        </p:spPr>
+        <p:style>
+          <a:lnRef idx="2">
+            <a:schemeClr val="dk1"/>
+          </a:lnRef>
+          <a:fillRef idx="0">
+            <a:schemeClr val="dk1"/>
+          </a:fillRef>
+          <a:effectRef idx="1">
+            <a:schemeClr val="dk1"/>
+          </a:effectRef>
+          <a:fontRef idx="minor">
+            <a:schemeClr val="tx1"/>
+          </a:fontRef>
+        </p:style>
+      </p:cxnSp>
+      <p:cxnSp>
+        <p:nvCxnSpPr>
+          <p:cNvPr id="248" name="カギ線コネクタ 247"/>
+          <p:cNvCxnSpPr>
+            <a:stCxn id="63" idx="3"/>
+            <a:endCxn id="48" idx="1"/>
+          </p:cNvCxnSpPr>
+          <p:nvPr/>
+        </p:nvCxnSpPr>
+        <p:spPr>
+          <a:xfrm flipV="1">
+            <a:off x="3838876" y="2264955"/>
+            <a:ext cx="4510430" cy="631328"/>
+          </a:xfrm>
+          <a:prstGeom prst="bentConnector3">
+            <a:avLst>
+              <a:gd name="adj1" fmla="val 5146"/>
+            </a:avLst>
+          </a:prstGeom>
+          <a:ln w="38100">
+            <a:tailEnd type="arrow"/>
+          </a:ln>
+        </p:spPr>
+        <p:style>
+          <a:lnRef idx="2">
+            <a:schemeClr val="dk1"/>
+          </a:lnRef>
+          <a:fillRef idx="0">
+            <a:schemeClr val="dk1"/>
+          </a:fillRef>
+          <a:effectRef idx="1">
+            <a:schemeClr val="dk1"/>
+          </a:effectRef>
+          <a:fontRef idx="minor">
+            <a:schemeClr val="tx1"/>
+          </a:fontRef>
+        </p:style>
+      </p:cxnSp>
+      <p:sp>
+        <p:nvSpPr>
+          <p:cNvPr id="361" name="正方形/長方形 360"/>
+          <p:cNvSpPr/>
+          <p:nvPr/>
+        </p:nvSpPr>
+        <p:spPr>
+          <a:xfrm>
+            <a:off x="4584141" y="5149794"/>
+            <a:ext cx="2989232" cy="499064"/>
+          </a:xfrm>
+          <a:prstGeom prst="rect">
+            <a:avLst/>
+          </a:prstGeom>
+          <a:effectLst>
+            <a:outerShdw blurRad="50800" dist="38100" dir="2700000" algn="tl" rotWithShape="0">
+              <a:prstClr val="black">
+                <a:alpha val="40000"/>
+              </a:prstClr>
+            </a:outerShdw>
+          </a:effectLst>
+        </p:spPr>
+        <p:style>
+          <a:lnRef idx="1">
+            <a:schemeClr val="accent4"/>
+          </a:lnRef>
+          <a:fillRef idx="2">
+            <a:schemeClr val="accent4"/>
+          </a:fillRef>
+          <a:effectRef idx="1">
+            <a:schemeClr val="accent4"/>
+          </a:effectRef>
+          <a:fontRef idx="minor">
+            <a:schemeClr val="dk1"/>
+          </a:fontRef>
+        </p:style>
+        <p:txBody>
+          <a:bodyPr rtlCol="0" anchor="ctr"/>
+          <a:lstStyle/>
+          <a:p>
+            <a:pPr algn="ctr"/>
+            <a:r>
+              <a:rPr lang="en-US" altLang="ja-JP" dirty="0" smtClean="0"/>
+              <a:t>&lt;&lt;interface&gt;&gt;</a:t>
+            </a:r>
+          </a:p>
+          <a:p>
+            <a:pPr algn="ctr"/>
+            <a:r>
+              <a:rPr lang="en-US" altLang="ja-JP" dirty="0" err="1"/>
+              <a:t>TokenEnhancer</a:t>
+            </a:r>
+            <a:endParaRPr lang="en-US" altLang="ja-JP" dirty="0"/>
+          </a:p>
+        </p:txBody>
+      </p:sp>
+      <p:cxnSp>
+        <p:nvCxnSpPr>
+          <p:cNvPr id="363" name="カギ線コネクタ 362"/>
+          <p:cNvCxnSpPr>
+            <a:stCxn id="67" idx="2"/>
+            <a:endCxn id="361" idx="0"/>
+          </p:cNvCxnSpPr>
+          <p:nvPr/>
+        </p:nvCxnSpPr>
+        <p:spPr>
+          <a:xfrm rot="5400000">
+            <a:off x="7709691" y="2900412"/>
+            <a:ext cx="618449" cy="3880315"/>
+          </a:xfrm>
+          <a:prstGeom prst="bentConnector3">
+            <a:avLst>
+              <a:gd name="adj1" fmla="val 50000"/>
+            </a:avLst>
+          </a:prstGeom>
+          <a:ln w="38100">
+            <a:tailEnd type="arrow"/>
+          </a:ln>
+        </p:spPr>
+        <p:style>
+          <a:lnRef idx="2">
+            <a:schemeClr val="dk1"/>
+          </a:lnRef>
+          <a:fillRef idx="0">
+            <a:schemeClr val="dk1"/>
+          </a:fillRef>
+          <a:effectRef idx="1">
+            <a:schemeClr val="dk1"/>
+          </a:effectRef>
+          <a:fontRef idx="minor">
+            <a:schemeClr val="tx1"/>
+          </a:fontRef>
+        </p:style>
+      </p:cxnSp>
+      <p:sp>
+        <p:nvSpPr>
+          <p:cNvPr id="34" name="テキスト ボックス 33"/>
+          <p:cNvSpPr txBox="1"/>
+          <p:nvPr/>
+        </p:nvSpPr>
+        <p:spPr>
+          <a:xfrm>
+            <a:off x="2372478" y="1226361"/>
+            <a:ext cx="719090" cy="369332"/>
+          </a:xfrm>
+          <a:prstGeom prst="rect">
+            <a:avLst/>
+          </a:prstGeom>
+          <a:noFill/>
+        </p:spPr>
+        <p:txBody>
+          <a:bodyPr wrap="square" rtlCol="0">
+            <a:spAutoFit/>
+          </a:bodyPr>
+          <a:lstStyle/>
+          <a:p>
+            <a:r>
+              <a:rPr lang="en-US" altLang="ja-JP" dirty="0" smtClean="0"/>
+              <a:t>(1)</a:t>
+            </a:r>
+            <a:endParaRPr lang="en-US" altLang="ja-JP" dirty="0"/>
+          </a:p>
+        </p:txBody>
+      </p:sp>
+      <p:sp>
+        <p:nvSpPr>
+          <p:cNvPr id="35" name="テキスト ボックス 34"/>
+          <p:cNvSpPr txBox="1"/>
+          <p:nvPr/>
+        </p:nvSpPr>
+        <p:spPr>
+          <a:xfrm>
+            <a:off x="3966030" y="2919775"/>
+            <a:ext cx="719090" cy="369332"/>
+          </a:xfrm>
+          <a:prstGeom prst="rect">
+            <a:avLst/>
+          </a:prstGeom>
+          <a:noFill/>
+        </p:spPr>
+        <p:txBody>
+          <a:bodyPr wrap="square" rtlCol="0">
+            <a:spAutoFit/>
+          </a:bodyPr>
+          <a:lstStyle/>
+          <a:p>
+            <a:r>
+              <a:rPr lang="en-US" altLang="ja-JP" smtClean="0"/>
+              <a:t>(2)</a:t>
+            </a:r>
+            <a:endParaRPr lang="en-US" altLang="ja-JP" dirty="0"/>
+          </a:p>
+        </p:txBody>
+      </p:sp>
+      <p:sp>
+        <p:nvSpPr>
+          <p:cNvPr id="38" name="テキスト ボックス 37"/>
+          <p:cNvSpPr txBox="1"/>
+          <p:nvPr/>
+        </p:nvSpPr>
+        <p:spPr>
+          <a:xfrm>
+            <a:off x="7870039" y="2439032"/>
+            <a:ext cx="719090" cy="369332"/>
+          </a:xfrm>
+          <a:prstGeom prst="rect">
+            <a:avLst/>
+          </a:prstGeom>
+          <a:noFill/>
+        </p:spPr>
+        <p:txBody>
+          <a:bodyPr wrap="square" rtlCol="0">
+            <a:spAutoFit/>
+          </a:bodyPr>
+          <a:lstStyle/>
+          <a:p>
+            <a:r>
+              <a:rPr lang="en-US" altLang="ja-JP" dirty="0" smtClean="0"/>
+              <a:t>(3)</a:t>
+            </a:r>
+            <a:endParaRPr lang="en-US" altLang="ja-JP" dirty="0"/>
+          </a:p>
+        </p:txBody>
+      </p:sp>
+      <p:sp>
+        <p:nvSpPr>
+          <p:cNvPr id="39" name="テキスト ボックス 38"/>
+          <p:cNvSpPr txBox="1"/>
+          <p:nvPr/>
+        </p:nvSpPr>
+        <p:spPr>
+          <a:xfrm>
+            <a:off x="3960615" y="3492714"/>
+            <a:ext cx="719090" cy="369332"/>
+          </a:xfrm>
+          <a:prstGeom prst="rect">
+            <a:avLst/>
+          </a:prstGeom>
+          <a:noFill/>
+        </p:spPr>
+        <p:txBody>
+          <a:bodyPr wrap="square" rtlCol="0">
+            <a:spAutoFit/>
+          </a:bodyPr>
+          <a:lstStyle/>
+          <a:p>
+            <a:r>
+              <a:rPr lang="en-US" altLang="ja-JP" dirty="0" smtClean="0"/>
+              <a:t>(4)</a:t>
+            </a:r>
+            <a:endParaRPr lang="en-US" altLang="ja-JP" dirty="0"/>
+          </a:p>
+        </p:txBody>
+      </p:sp>
+      <p:sp>
+        <p:nvSpPr>
+          <p:cNvPr id="40" name="テキスト ボックス 39"/>
+          <p:cNvSpPr txBox="1"/>
+          <p:nvPr/>
+        </p:nvSpPr>
+        <p:spPr>
+          <a:xfrm>
+            <a:off x="3966895" y="4136346"/>
+            <a:ext cx="719090" cy="369332"/>
+          </a:xfrm>
+          <a:prstGeom prst="rect">
+            <a:avLst/>
+          </a:prstGeom>
+          <a:noFill/>
+        </p:spPr>
+        <p:txBody>
+          <a:bodyPr wrap="square" rtlCol="0">
+            <a:spAutoFit/>
+          </a:bodyPr>
+          <a:lstStyle/>
+          <a:p>
+            <a:r>
+              <a:rPr lang="en-US" altLang="ja-JP" dirty="0" smtClean="0"/>
+              <a:t>(5)</a:t>
+            </a:r>
+            <a:endParaRPr lang="en-US" altLang="ja-JP" dirty="0"/>
+          </a:p>
+        </p:txBody>
+      </p:sp>
+      <p:sp>
+        <p:nvSpPr>
+          <p:cNvPr id="41" name="テキスト ボックス 40"/>
+          <p:cNvSpPr txBox="1"/>
+          <p:nvPr/>
+        </p:nvSpPr>
+        <p:spPr>
+          <a:xfrm>
+            <a:off x="7757176" y="4846863"/>
+            <a:ext cx="719090" cy="369332"/>
+          </a:xfrm>
+          <a:prstGeom prst="rect">
+            <a:avLst/>
+          </a:prstGeom>
+          <a:noFill/>
+        </p:spPr>
+        <p:txBody>
+          <a:bodyPr wrap="square" rtlCol="0">
+            <a:spAutoFit/>
+          </a:bodyPr>
+          <a:lstStyle/>
+          <a:p>
+            <a:r>
+              <a:rPr lang="en-US" altLang="ja-JP" dirty="0" smtClean="0"/>
+              <a:t>(7)</a:t>
+            </a:r>
+            <a:endParaRPr lang="en-US" altLang="ja-JP" dirty="0"/>
+          </a:p>
+        </p:txBody>
+      </p:sp>
+      <p:sp>
+        <p:nvSpPr>
+          <p:cNvPr id="42" name="テキスト ボックス 41"/>
+          <p:cNvSpPr txBox="1"/>
+          <p:nvPr/>
+        </p:nvSpPr>
+        <p:spPr>
+          <a:xfrm>
+            <a:off x="10004481" y="4610499"/>
+            <a:ext cx="719090" cy="369332"/>
+          </a:xfrm>
+          <a:prstGeom prst="rect">
+            <a:avLst/>
+          </a:prstGeom>
+          <a:noFill/>
+        </p:spPr>
+        <p:txBody>
+          <a:bodyPr wrap="square" rtlCol="0">
+            <a:spAutoFit/>
+          </a:bodyPr>
+          <a:lstStyle/>
+          <a:p>
+            <a:r>
+              <a:rPr lang="en-US" altLang="ja-JP" smtClean="0"/>
+              <a:t>(8)</a:t>
+            </a:r>
+            <a:endParaRPr lang="en-US" altLang="ja-JP" dirty="0"/>
+          </a:p>
+        </p:txBody>
+      </p:sp>
+      <p:sp>
+        <p:nvSpPr>
+          <p:cNvPr id="43" name="テキスト ボックス 42"/>
+          <p:cNvSpPr txBox="1"/>
+          <p:nvPr/>
+        </p:nvSpPr>
+        <p:spPr>
+          <a:xfrm>
+            <a:off x="7682189" y="3804236"/>
+            <a:ext cx="719090" cy="369332"/>
+          </a:xfrm>
+          <a:prstGeom prst="rect">
+            <a:avLst/>
+          </a:prstGeom>
+          <a:noFill/>
+        </p:spPr>
+        <p:txBody>
+          <a:bodyPr wrap="square" rtlCol="0">
+            <a:spAutoFit/>
+          </a:bodyPr>
+          <a:lstStyle/>
+          <a:p>
+            <a:r>
+              <a:rPr lang="en-US" altLang="ja-JP" dirty="0" smtClean="0"/>
+              <a:t>(6)</a:t>
+            </a:r>
+            <a:endParaRPr lang="en-US" altLang="ja-JP" dirty="0"/>
+          </a:p>
+        </p:txBody>
+      </p:sp>
+      <p:sp>
+        <p:nvSpPr>
+          <p:cNvPr id="45" name="正方形/長方形 44"/>
+          <p:cNvSpPr/>
+          <p:nvPr/>
+        </p:nvSpPr>
+        <p:spPr>
+          <a:xfrm>
+            <a:off x="4458070" y="2514486"/>
+            <a:ext cx="3241377" cy="2023223"/>
+          </a:xfrm>
+          <a:prstGeom prst="rect">
+            <a:avLst/>
+          </a:prstGeom>
+          <a:noFill/>
+          <a:ln w="38100">
+            <a:solidFill>
+              <a:schemeClr val="accent1">
+                <a:lumMod val="60000"/>
+                <a:lumOff val="40000"/>
+              </a:schemeClr>
+            </a:solidFill>
+          </a:ln>
+        </p:spPr>
+        <p:style>
+          <a:lnRef idx="2">
+            <a:schemeClr val="accent1">
+              <a:shade val="50000"/>
+            </a:schemeClr>
+          </a:lnRef>
+          <a:fillRef idx="1">
+            <a:schemeClr val="accent1"/>
+          </a:fillRef>
+          <a:effectRef idx="0">
+            <a:schemeClr val="accent1"/>
+          </a:effectRef>
+          <a:fontRef idx="minor">
+            <a:schemeClr val="lt1"/>
+          </a:fontRef>
+        </p:style>
+        <p:txBody>
+          <a:bodyPr rtlCol="0" anchor="ctr"/>
+          <a:lstStyle/>
+          <a:p>
+            <a:pPr algn="ctr"/>
+            <a:endParaRPr kumimoji="1" lang="ja-JP" altLang="en-US"/>
+          </a:p>
+        </p:txBody>
+      </p:sp>
+      <p:sp>
+        <p:nvSpPr>
+          <p:cNvPr id="67" name="正方形/長方形 66"/>
+          <p:cNvSpPr/>
+          <p:nvPr/>
+        </p:nvSpPr>
+        <p:spPr>
+          <a:xfrm>
+            <a:off x="8116721" y="2917323"/>
+            <a:ext cx="3684701" cy="1614022"/>
+          </a:xfrm>
+          <a:prstGeom prst="rect">
+            <a:avLst/>
+          </a:prstGeom>
+          <a:noFill/>
+          <a:ln w="38100">
+            <a:solidFill>
+              <a:schemeClr val="accent1">
+                <a:lumMod val="60000"/>
+                <a:lumOff val="40000"/>
+              </a:schemeClr>
+            </a:solidFill>
+          </a:ln>
+        </p:spPr>
+        <p:style>
+          <a:lnRef idx="2">
+            <a:schemeClr val="accent1">
+              <a:shade val="50000"/>
+            </a:schemeClr>
+          </a:lnRef>
+          <a:fillRef idx="1">
+            <a:schemeClr val="accent1"/>
+          </a:fillRef>
+          <a:effectRef idx="0">
+            <a:schemeClr val="accent1"/>
+          </a:effectRef>
+          <a:fontRef idx="minor">
+            <a:schemeClr val="lt1"/>
+          </a:fontRef>
+        </p:style>
+        <p:txBody>
+          <a:bodyPr rtlCol="0" anchor="ctr"/>
+          <a:lstStyle/>
+          <a:p>
+            <a:pPr algn="ctr"/>
+            <a:endParaRPr kumimoji="1" lang="ja-JP" altLang="en-US"/>
+          </a:p>
+        </p:txBody>
+      </p:sp>
+      <p:cxnSp>
+        <p:nvCxnSpPr>
+          <p:cNvPr id="86" name="カギ線コネクタ 100"/>
+          <p:cNvCxnSpPr/>
+          <p:nvPr/>
+        </p:nvCxnSpPr>
+        <p:spPr>
+          <a:xfrm flipH="1">
+            <a:off x="3838874" y="4116134"/>
+            <a:ext cx="619195" cy="0"/>
+          </a:xfrm>
+          <a:prstGeom prst="straightConnector1">
+            <a:avLst/>
+          </a:prstGeom>
+          <a:ln w="38100">
+            <a:headEnd type="arrow"/>
+            <a:tailEnd type="none"/>
+          </a:ln>
+        </p:spPr>
+        <p:style>
+          <a:lnRef idx="2">
+            <a:schemeClr val="dk1"/>
+          </a:lnRef>
+          <a:fillRef idx="0">
+            <a:schemeClr val="dk1"/>
+          </a:fillRef>
+          <a:effectRef idx="1">
+            <a:schemeClr val="dk1"/>
+          </a:effectRef>
+          <a:fontRef idx="minor">
+            <a:schemeClr val="tx1"/>
+          </a:fontRef>
+        </p:style>
+      </p:cxnSp>
+    </p:spTree>
+    <p:extLst>
+      <p:ext uri="{BB962C8B-B14F-4D97-AF65-F5344CB8AC3E}">
+        <p14:creationId xmlns:p14="http://schemas.microsoft.com/office/powerpoint/2010/main" val="827273343"/>
+      </p:ext>
+    </p:extLst>
+  </p:cSld>
+  <p:clrMapOvr>
+    <a:masterClrMapping/>
+  </p:clrMapOvr>
+  <p:timing>
+    <p:tnLst>
+      <p:par>
+        <p:cTn id="1" dur="indefinite" restart="never" nodeType="tmRoot"/>
+      </p:par>
+    </p:tnLst>
+  </p:timing>
+</p:sld>
+</file>
+
 <file path=ppt/slides/slide3.xml><?xml version="1.0" encoding="utf-8"?>
 <p:sld xmlns:a="http://schemas.openxmlformats.org/drawingml/2006/main" xmlns:r="http://schemas.openxmlformats.org/officeDocument/2006/relationships" xmlns:p="http://schemas.openxmlformats.org/presentationml/2006/main">
   <p:cSld>

</xml_diff>

<commit_message>
Improvement Description Of Oauth #2891
(cherry picked from commit f47165dc4434241fee67bd3e79081593660134af)
</commit_message>
<xml_diff>
--- a/source/Security/images_OAuth/materialOAuth.pptx
+++ b/source/Security/images_OAuth/materialOAuth.pptx
@@ -21,13 +21,13 @@
     <p:sldId id="264" r:id="rId12"/>
     <p:sldId id="285" r:id="rId13"/>
     <p:sldId id="295" r:id="rId14"/>
-    <p:sldId id="281" r:id="rId15"/>
+    <p:sldId id="300" r:id="rId15"/>
     <p:sldId id="286" r:id="rId16"/>
     <p:sldId id="274" r:id="rId17"/>
     <p:sldId id="268" r:id="rId18"/>
     <p:sldId id="269" r:id="rId19"/>
     <p:sldId id="257" r:id="rId20"/>
-    <p:sldId id="270" r:id="rId21"/>
+    <p:sldId id="299" r:id="rId21"/>
     <p:sldId id="271" r:id="rId22"/>
     <p:sldId id="296" r:id="rId23"/>
     <p:sldId id="298" r:id="rId24"/>
@@ -147,7 +147,7 @@
             <p14:sldId id="264"/>
             <p14:sldId id="285"/>
             <p14:sldId id="295"/>
-            <p14:sldId id="281"/>
+            <p14:sldId id="300"/>
             <p14:sldId id="286"/>
             <p14:sldId id="274"/>
           </p14:sldIdLst>
@@ -161,7 +161,7 @@
         <p14:section name="How to Extend" id="{26D12C5C-39A1-4EE1-A6D1-BDC8A15DC492}">
           <p14:sldIdLst>
             <p14:sldId id="257"/>
-            <p14:sldId id="270"/>
+            <p14:sldId id="299"/>
             <p14:sldId id="271"/>
           </p14:sldIdLst>
         </p14:section>
@@ -262,7 +262,7 @@
           <a:p>
             <a:fld id="{E364C4AB-FECB-4A61-B71C-A45CCAC46987}" type="datetimeFigureOut">
               <a:rPr kumimoji="1" lang="ja-JP" altLang="en-US" smtClean="0"/>
-              <a:t>2017/8/31</a:t>
+              <a:t>2017/9/7</a:t>
             </a:fld>
             <a:endParaRPr kumimoji="1" lang="ja-JP" altLang="en-US"/>
           </a:p>
@@ -1392,7 +1392,7 @@
     </p:spTree>
     <p:extLst>
       <p:ext uri="{BB962C8B-B14F-4D97-AF65-F5344CB8AC3E}">
-        <p14:creationId xmlns:p14="http://schemas.microsoft.com/office/powerpoint/2010/main" val="427632005"/>
+        <p14:creationId xmlns:p14="http://schemas.microsoft.com/office/powerpoint/2010/main" val="1419956975"/>
       </p:ext>
     </p:extLst>
   </p:cSld>
@@ -1617,7 +1617,7 @@
           <a:p>
             <a:fld id="{22B92BF3-AD3C-41E2-AD5A-4FFB42BC5A7D}" type="datetimeFigureOut">
               <a:rPr kumimoji="1" lang="ja-JP" altLang="en-US" smtClean="0"/>
-              <a:t>2017/8/31</a:t>
+              <a:t>2017/9/7</a:t>
             </a:fld>
             <a:endParaRPr kumimoji="1" lang="ja-JP" altLang="en-US"/>
           </a:p>
@@ -1819,7 +1819,7 @@
           <a:p>
             <a:fld id="{22B92BF3-AD3C-41E2-AD5A-4FFB42BC5A7D}" type="datetimeFigureOut">
               <a:rPr kumimoji="1" lang="ja-JP" altLang="en-US" smtClean="0"/>
-              <a:t>2017/8/31</a:t>
+              <a:t>2017/9/7</a:t>
             </a:fld>
             <a:endParaRPr kumimoji="1" lang="ja-JP" altLang="en-US"/>
           </a:p>
@@ -2031,7 +2031,7 @@
           <a:p>
             <a:fld id="{22B92BF3-AD3C-41E2-AD5A-4FFB42BC5A7D}" type="datetimeFigureOut">
               <a:rPr kumimoji="1" lang="ja-JP" altLang="en-US" smtClean="0"/>
-              <a:t>2017/8/31</a:t>
+              <a:t>2017/9/7</a:t>
             </a:fld>
             <a:endParaRPr kumimoji="1" lang="ja-JP" altLang="en-US"/>
           </a:p>
@@ -2233,7 +2233,7 @@
           <a:p>
             <a:fld id="{22B92BF3-AD3C-41E2-AD5A-4FFB42BC5A7D}" type="datetimeFigureOut">
               <a:rPr kumimoji="1" lang="ja-JP" altLang="en-US" smtClean="0"/>
-              <a:t>2017/8/31</a:t>
+              <a:t>2017/9/7</a:t>
             </a:fld>
             <a:endParaRPr kumimoji="1" lang="ja-JP" altLang="en-US"/>
           </a:p>
@@ -2479,7 +2479,7 @@
           <a:p>
             <a:fld id="{22B92BF3-AD3C-41E2-AD5A-4FFB42BC5A7D}" type="datetimeFigureOut">
               <a:rPr kumimoji="1" lang="ja-JP" altLang="en-US" smtClean="0"/>
-              <a:t>2017/8/31</a:t>
+              <a:t>2017/9/7</a:t>
             </a:fld>
             <a:endParaRPr kumimoji="1" lang="ja-JP" altLang="en-US"/>
           </a:p>
@@ -2775,7 +2775,7 @@
           <a:p>
             <a:fld id="{22B92BF3-AD3C-41E2-AD5A-4FFB42BC5A7D}" type="datetimeFigureOut">
               <a:rPr kumimoji="1" lang="ja-JP" altLang="en-US" smtClean="0"/>
-              <a:t>2017/8/31</a:t>
+              <a:t>2017/9/7</a:t>
             </a:fld>
             <a:endParaRPr kumimoji="1" lang="ja-JP" altLang="en-US"/>
           </a:p>
@@ -3206,7 +3206,7 @@
           <a:p>
             <a:fld id="{22B92BF3-AD3C-41E2-AD5A-4FFB42BC5A7D}" type="datetimeFigureOut">
               <a:rPr kumimoji="1" lang="ja-JP" altLang="en-US" smtClean="0"/>
-              <a:t>2017/8/31</a:t>
+              <a:t>2017/9/7</a:t>
             </a:fld>
             <a:endParaRPr kumimoji="1" lang="ja-JP" altLang="en-US"/>
           </a:p>
@@ -3324,7 +3324,7 @@
           <a:p>
             <a:fld id="{22B92BF3-AD3C-41E2-AD5A-4FFB42BC5A7D}" type="datetimeFigureOut">
               <a:rPr kumimoji="1" lang="ja-JP" altLang="en-US" smtClean="0"/>
-              <a:t>2017/8/31</a:t>
+              <a:t>2017/9/7</a:t>
             </a:fld>
             <a:endParaRPr kumimoji="1" lang="ja-JP" altLang="en-US"/>
           </a:p>
@@ -3419,7 +3419,7 @@
           <a:p>
             <a:fld id="{22B92BF3-AD3C-41E2-AD5A-4FFB42BC5A7D}" type="datetimeFigureOut">
               <a:rPr kumimoji="1" lang="ja-JP" altLang="en-US" smtClean="0"/>
-              <a:t>2017/8/31</a:t>
+              <a:t>2017/9/7</a:t>
             </a:fld>
             <a:endParaRPr kumimoji="1" lang="ja-JP" altLang="en-US"/>
           </a:p>
@@ -3728,7 +3728,7 @@
           <a:p>
             <a:fld id="{22B92BF3-AD3C-41E2-AD5A-4FFB42BC5A7D}" type="datetimeFigureOut">
               <a:rPr kumimoji="1" lang="ja-JP" altLang="en-US" smtClean="0"/>
-              <a:t>2017/8/31</a:t>
+              <a:t>2017/9/7</a:t>
             </a:fld>
             <a:endParaRPr kumimoji="1" lang="ja-JP" altLang="en-US"/>
           </a:p>
@@ -3981,7 +3981,7 @@
           <a:p>
             <a:fld id="{22B92BF3-AD3C-41E2-AD5A-4FFB42BC5A7D}" type="datetimeFigureOut">
               <a:rPr kumimoji="1" lang="ja-JP" altLang="en-US" smtClean="0"/>
-              <a:t>2017/8/31</a:t>
+              <a:t>2017/9/7</a:t>
             </a:fld>
             <a:endParaRPr kumimoji="1" lang="ja-JP" altLang="en-US"/>
           </a:p>
@@ -4226,7 +4226,7 @@
           <a:p>
             <a:fld id="{22B92BF3-AD3C-41E2-AD5A-4FFB42BC5A7D}" type="datetimeFigureOut">
               <a:rPr kumimoji="1" lang="ja-JP" altLang="en-US" smtClean="0"/>
-              <a:t>2017/8/31</a:t>
+              <a:t>2017/9/7</a:t>
             </a:fld>
             <a:endParaRPr kumimoji="1" lang="ja-JP" altLang="en-US"/>
           </a:p>
@@ -13681,6 +13681,36 @@
           <a:p>
             <a:r>
               <a:rPr lang="en-US" altLang="ja-JP" dirty="0" smtClean="0"/>
+              <a:t>(6)</a:t>
+            </a:r>
+            <a:endParaRPr lang="en-US" altLang="ja-JP" dirty="0"/>
+          </a:p>
+        </p:txBody>
+      </p:sp>
+      <p:sp>
+        <p:nvSpPr>
+          <p:cNvPr id="28" name="テキスト ボックス 27"/>
+          <p:cNvSpPr txBox="1"/>
+          <p:nvPr/>
+        </p:nvSpPr>
+        <p:spPr>
+          <a:xfrm>
+            <a:off x="10039132" y="2627436"/>
+            <a:ext cx="719090" cy="369332"/>
+          </a:xfrm>
+          <a:prstGeom prst="rect">
+            <a:avLst/>
+          </a:prstGeom>
+          <a:noFill/>
+        </p:spPr>
+        <p:txBody>
+          <a:bodyPr wrap="square" rtlCol="0">
+            <a:spAutoFit/>
+          </a:bodyPr>
+          <a:lstStyle/>
+          <a:p>
+            <a:r>
+              <a:rPr lang="en-US" altLang="ja-JP" dirty="0" smtClean="0"/>
               <a:t>(5)</a:t>
             </a:r>
             <a:endParaRPr lang="en-US" altLang="ja-JP" dirty="0"/>
@@ -13690,7 +13720,7 @@
     </p:spTree>
     <p:extLst>
       <p:ext uri="{BB962C8B-B14F-4D97-AF65-F5344CB8AC3E}">
-        <p14:creationId xmlns:p14="http://schemas.microsoft.com/office/powerpoint/2010/main" val="3205589076"/>
+        <p14:creationId xmlns:p14="http://schemas.microsoft.com/office/powerpoint/2010/main" val="763483088"/>
       </p:ext>
     </p:extLst>
   </p:cSld>
@@ -22621,7 +22651,7 @@
         <p:spPr>
           <a:xfrm>
             <a:off x="659332" y="1610571"/>
-            <a:ext cx="1366993" cy="717761"/>
+            <a:ext cx="1448868" cy="405047"/>
           </a:xfrm>
           <a:prstGeom prst="rect">
             <a:avLst/>
@@ -22642,44 +22672,10 @@
           </a:p>
         </p:txBody>
       </p:sp>
-      <p:sp>
-        <p:nvSpPr>
-          <p:cNvPr id="25" name="テキスト ボックス 24"/>
-          <p:cNvSpPr txBox="1"/>
-          <p:nvPr/>
-        </p:nvSpPr>
-        <p:spPr>
-          <a:xfrm>
-            <a:off x="1983898" y="1610571"/>
-            <a:ext cx="1158960" cy="405047"/>
-          </a:xfrm>
-          <a:prstGeom prst="rect">
-            <a:avLst/>
-          </a:prstGeom>
-          <a:noFill/>
-        </p:spPr>
-        <p:txBody>
-          <a:bodyPr wrap="square" rtlCol="0">
-            <a:spAutoFit/>
-          </a:bodyPr>
-          <a:lstStyle/>
-          <a:p>
-            <a:r>
-              <a:rPr lang="ja-JP" altLang="en-US" sz="2032" dirty="0"/>
-              <a:t>・・・</a:t>
-            </a:r>
-            <a:r>
-              <a:rPr lang="en-US" altLang="ja-JP" sz="2032" dirty="0"/>
-              <a:t>(1)</a:t>
-            </a:r>
-            <a:endParaRPr lang="ja-JP" altLang="en-US" sz="2032" dirty="0"/>
-          </a:p>
-        </p:txBody>
-      </p:sp>
     </p:spTree>
     <p:extLst>
       <p:ext uri="{BB962C8B-B14F-4D97-AF65-F5344CB8AC3E}">
-        <p14:creationId xmlns:p14="http://schemas.microsoft.com/office/powerpoint/2010/main" val="1887756056"/>
+        <p14:creationId xmlns:p14="http://schemas.microsoft.com/office/powerpoint/2010/main" val="779814625"/>
       </p:ext>
     </p:extLst>
   </p:cSld>

</xml_diff>